<commit_message>
saving story creation progress + important msg
apparently today is meant to be iwp alpha build presentation :DDDD
guess who didnt touch anything ahahahahhahahah
anyways im dead BUT i can still post other milestone dates
milestone 1: proposal + pitch (overdue)
milestone 2: project progress (alpha build) + game design (overdue)
milestone 3: test plan + play test report + beta build (due wk 14)
milestone 4: final presentation + tdd + gdd + final build + source code (due wk 17, ABSOLUTE DEADLINE)
reminder: ITS FUCKIN WEEK 8
and im still alive haha ::::)))))
how have i managed to survive until now
how did i even make it past pri n sec sch
i dont deserve to have made it this far with the quality of work i submit and the amount of late work
hahahahahahahahahahahahahahahahhah
</commit_message>
<xml_diff>
--- a/story creation/assignment submission/DM1374_GSTORY_3-ActTemplate (submission).pptx
+++ b/story creation/assignment submission/DM1374_GSTORY_3-ActTemplate (submission).pptx
@@ -5,13 +5,14 @@
     <p:sldMasterId id="2147483648" r:id="rId1"/>
   </p:sldMasterIdLst>
   <p:notesMasterIdLst>
-    <p:notesMasterId r:id="rId6"/>
+    <p:notesMasterId r:id="rId7"/>
   </p:notesMasterIdLst>
   <p:sldIdLst>
     <p:sldId id="395" r:id="rId2"/>
     <p:sldId id="400" r:id="rId3"/>
-    <p:sldId id="396" r:id="rId4"/>
-    <p:sldId id="397" r:id="rId5"/>
+    <p:sldId id="401" r:id="rId4"/>
+    <p:sldId id="396" r:id="rId5"/>
+    <p:sldId id="397" r:id="rId6"/>
   </p:sldIdLst>
   <p:sldSz cx="9144000" cy="6858000" type="screen4x3"/>
   <p:notesSz cx="6858000" cy="9144000"/>
@@ -225,7 +226,7 @@
           <a:p>
             <a:fld id="{9E77AEFE-1327-4844-B4B5-F41F35B17512}" type="datetimeFigureOut">
               <a:rPr lang="en-GB" smtClean="0"/>
-              <a:t>04/06/2024</a:t>
+              <a:t>05/06/2024</a:t>
             </a:fld>
             <a:endParaRPr lang="en-GB"/>
           </a:p>
@@ -674,7 +675,7 @@
           <a:p>
             <a:fld id="{49519E08-BB37-41FD-BEA8-F976E813BFC7}" type="datetimeFigureOut">
               <a:rPr lang="en-GB" smtClean="0"/>
-              <a:t>04/06/2024</a:t>
+              <a:t>05/06/2024</a:t>
             </a:fld>
             <a:endParaRPr lang="en-GB"/>
           </a:p>
@@ -926,7 +927,7 @@
           <a:p>
             <a:fld id="{49519E08-BB37-41FD-BEA8-F976E813BFC7}" type="datetimeFigureOut">
               <a:rPr lang="en-GB" smtClean="0"/>
-              <a:t>04/06/2024</a:t>
+              <a:t>05/06/2024</a:t>
             </a:fld>
             <a:endParaRPr lang="en-GB"/>
           </a:p>
@@ -1147,7 +1148,7 @@
           <a:p>
             <a:fld id="{49519E08-BB37-41FD-BEA8-F976E813BFC7}" type="datetimeFigureOut">
               <a:rPr lang="en-GB" smtClean="0"/>
-              <a:t>04/06/2024</a:t>
+              <a:t>05/06/2024</a:t>
             </a:fld>
             <a:endParaRPr lang="en-GB"/>
           </a:p>
@@ -1369,7 +1370,7 @@
           <a:p>
             <a:fld id="{49519E08-BB37-41FD-BEA8-F976E813BFC7}" type="datetimeFigureOut">
               <a:rPr lang="en-GB" smtClean="0"/>
-              <a:t>04/06/2024</a:t>
+              <a:t>05/06/2024</a:t>
             </a:fld>
             <a:endParaRPr lang="en-GB"/>
           </a:p>
@@ -1656,7 +1657,7 @@
           <a:p>
             <a:fld id="{49519E08-BB37-41FD-BEA8-F976E813BFC7}" type="datetimeFigureOut">
               <a:rPr lang="en-GB" smtClean="0"/>
-              <a:t>04/06/2024</a:t>
+              <a:t>05/06/2024</a:t>
             </a:fld>
             <a:endParaRPr lang="en-GB"/>
           </a:p>
@@ -1985,7 +1986,7 @@
           <a:p>
             <a:fld id="{49519E08-BB37-41FD-BEA8-F976E813BFC7}" type="datetimeFigureOut">
               <a:rPr lang="en-GB" smtClean="0"/>
-              <a:t>04/06/2024</a:t>
+              <a:t>05/06/2024</a:t>
             </a:fld>
             <a:endParaRPr lang="en-GB"/>
           </a:p>
@@ -2448,7 +2449,7 @@
           <a:p>
             <a:fld id="{49519E08-BB37-41FD-BEA8-F976E813BFC7}" type="datetimeFigureOut">
               <a:rPr lang="en-GB" smtClean="0"/>
-              <a:t>04/06/2024</a:t>
+              <a:t>05/06/2024</a:t>
             </a:fld>
             <a:endParaRPr lang="en-GB"/>
           </a:p>
@@ -2607,7 +2608,7 @@
           <a:p>
             <a:fld id="{49519E08-BB37-41FD-BEA8-F976E813BFC7}" type="datetimeFigureOut">
               <a:rPr lang="en-GB" smtClean="0"/>
-              <a:t>04/06/2024</a:t>
+              <a:t>05/06/2024</a:t>
             </a:fld>
             <a:endParaRPr lang="en-GB"/>
           </a:p>
@@ -2743,7 +2744,7 @@
           <a:p>
             <a:fld id="{49519E08-BB37-41FD-BEA8-F976E813BFC7}" type="datetimeFigureOut">
               <a:rPr lang="en-GB" smtClean="0"/>
-              <a:t>04/06/2024</a:t>
+              <a:t>05/06/2024</a:t>
             </a:fld>
             <a:endParaRPr lang="en-GB"/>
           </a:p>
@@ -3061,7 +3062,7 @@
           <a:p>
             <a:fld id="{49519E08-BB37-41FD-BEA8-F976E813BFC7}" type="datetimeFigureOut">
               <a:rPr lang="en-GB" smtClean="0"/>
-              <a:t>04/06/2024</a:t>
+              <a:t>05/06/2024</a:t>
             </a:fld>
             <a:endParaRPr lang="en-GB"/>
           </a:p>
@@ -3355,7 +3356,7 @@
           <a:p>
             <a:fld id="{49519E08-BB37-41FD-BEA8-F976E813BFC7}" type="datetimeFigureOut">
               <a:rPr lang="en-GB" smtClean="0"/>
-              <a:t>04/06/2024</a:t>
+              <a:t>05/06/2024</a:t>
             </a:fld>
             <a:endParaRPr lang="en-GB"/>
           </a:p>
@@ -3614,7 +3615,7 @@
           <a:p>
             <a:fld id="{49519E08-BB37-41FD-BEA8-F976E813BFC7}" type="datetimeFigureOut">
               <a:rPr lang="en-GB" smtClean="0"/>
-              <a:t>04/06/2024</a:t>
+              <a:t>05/06/2024</a:t>
             </a:fld>
             <a:endParaRPr lang="en-GB"/>
           </a:p>
@@ -4224,6 +4225,138 @@
           </a:p>
         </p:txBody>
       </p:sp>
+      <p:sp>
+        <p:nvSpPr>
+          <p:cNvPr id="6" name="TextBox 5">
+            <a:extLst>
+              <a:ext uri="{FF2B5EF4-FFF2-40B4-BE49-F238E27FC236}">
+                <a16:creationId xmlns:a16="http://schemas.microsoft.com/office/drawing/2014/main" id="{0EC50913-6023-89BC-D55A-881201196F12}"/>
+              </a:ext>
+            </a:extLst>
+          </p:cNvPr>
+          <p:cNvSpPr txBox="1"/>
+          <p:nvPr/>
+        </p:nvSpPr>
+        <p:spPr>
+          <a:xfrm>
+            <a:off x="899591" y="5301208"/>
+            <a:ext cx="7272809" cy="954107"/>
+          </a:xfrm>
+          <a:prstGeom prst="rect">
+            <a:avLst/>
+          </a:prstGeom>
+          <a:solidFill>
+            <a:schemeClr val="bg1">
+              <a:lumMod val="65000"/>
+            </a:schemeClr>
+          </a:solidFill>
+        </p:spPr>
+        <p:txBody>
+          <a:bodyPr wrap="square" rtlCol="0">
+            <a:spAutoFit/>
+          </a:bodyPr>
+          <a:lstStyle/>
+          <a:p>
+            <a:r>
+              <a:rPr lang="en-US" sz="1400" dirty="0">
+                <a:solidFill>
+                  <a:schemeClr val="tx1">
+                    <a:lumMod val="95000"/>
+                    <a:lumOff val="5000"/>
+                  </a:schemeClr>
+                </a:solidFill>
+                <a:latin typeface="Century Gothic" panose="020B0502020202020204" pitchFamily="34" charset="0"/>
+              </a:rPr>
+              <a:t>Font style legend:</a:t>
+            </a:r>
+            <a:br>
+              <a:rPr lang="en-US" sz="1400" dirty="0">
+                <a:solidFill>
+                  <a:schemeClr val="tx1">
+                    <a:lumMod val="95000"/>
+                    <a:lumOff val="5000"/>
+                  </a:schemeClr>
+                </a:solidFill>
+                <a:latin typeface="Century Gothic" panose="020B0502020202020204" pitchFamily="34" charset="0"/>
+              </a:rPr>
+            </a:br>
+            <a:r>
+              <a:rPr lang="en-US" sz="1400" strike="sngStrike" dirty="0">
+                <a:solidFill>
+                  <a:schemeClr val="bg1">
+                    <a:lumMod val="50000"/>
+                  </a:schemeClr>
+                </a:solidFill>
+                <a:latin typeface="Century Gothic" panose="020B0502020202020204" pitchFamily="34" charset="0"/>
+              </a:rPr>
+              <a:t>grey and strikethrough</a:t>
+            </a:r>
+            <a:r>
+              <a:rPr lang="en-US" sz="1400" dirty="0">
+                <a:solidFill>
+                  <a:schemeClr val="bg1">
+                    <a:lumMod val="50000"/>
+                  </a:schemeClr>
+                </a:solidFill>
+                <a:latin typeface="Century Gothic" panose="020B0502020202020204" pitchFamily="34" charset="0"/>
+              </a:rPr>
+              <a:t> </a:t>
+            </a:r>
+            <a:r>
+              <a:rPr lang="en-US" sz="1400" dirty="0">
+                <a:solidFill>
+                  <a:schemeClr val="tx1">
+                    <a:lumMod val="95000"/>
+                    <a:lumOff val="5000"/>
+                  </a:schemeClr>
+                </a:solidFill>
+                <a:latin typeface="Century Gothic" panose="020B0502020202020204" pitchFamily="34" charset="0"/>
+              </a:rPr>
+              <a:t>– old and changed story</a:t>
+            </a:r>
+          </a:p>
+          <a:p>
+            <a:r>
+              <a:rPr lang="en-US" sz="1400" dirty="0">
+                <a:solidFill>
+                  <a:schemeClr val="tx2">
+                    <a:lumMod val="60000"/>
+                    <a:lumOff val="40000"/>
+                  </a:schemeClr>
+                </a:solidFill>
+                <a:latin typeface="Century Gothic" panose="020B0502020202020204" pitchFamily="34" charset="0"/>
+              </a:rPr>
+              <a:t>Blue</a:t>
+            </a:r>
+            <a:r>
+              <a:rPr lang="en-US" sz="1400" dirty="0">
+                <a:solidFill>
+                  <a:schemeClr val="tx1">
+                    <a:lumMod val="95000"/>
+                    <a:lumOff val="5000"/>
+                  </a:schemeClr>
+                </a:solidFill>
+                <a:latin typeface="Century Gothic" panose="020B0502020202020204" pitchFamily="34" charset="0"/>
+              </a:rPr>
+              <a:t> – own comments</a:t>
+            </a:r>
+          </a:p>
+          <a:p>
+            <a:r>
+              <a:rPr lang="en-US" sz="1400" dirty="0">
+                <a:solidFill>
+                  <a:schemeClr val="tx1">
+                    <a:lumMod val="95000"/>
+                    <a:lumOff val="5000"/>
+                  </a:schemeClr>
+                </a:solidFill>
+                <a:latin typeface="Century Gothic" panose="020B0502020202020204" pitchFamily="34" charset="0"/>
+              </a:rPr>
+              <a:t>Black – confirmed story </a:t>
+            </a:r>
+          </a:p>
+        </p:txBody>
+      </p:sp>
     </p:spTree>
     <p:extLst>
       <p:ext uri="{BB962C8B-B14F-4D97-AF65-F5344CB8AC3E}">
@@ -4266,7 +4399,7 @@
         </p:nvSpPr>
         <p:spPr>
           <a:xfrm>
-            <a:off x="457198" y="1268760"/>
+            <a:off x="457199" y="980728"/>
             <a:ext cx="8229602" cy="4124953"/>
           </a:xfrm>
         </p:spPr>
@@ -4275,20 +4408,6 @@
             <a:noAutofit/>
           </a:bodyPr>
           <a:lstStyle/>
-          <a:p>
-            <a:pPr marL="0" indent="0">
-              <a:buNone/>
-            </a:pPr>
-            <a:r>
-              <a:rPr lang="en-GB" sz="2100" b="1" dirty="0">
-                <a:solidFill>
-                  <a:srgbClr val="FF6600"/>
-                </a:solidFill>
-                <a:latin typeface="Century Gothic" panose="020B0502020202020204" pitchFamily="34" charset="0"/>
-              </a:rPr>
-              <a:t>Act 1 (Set Up)</a:t>
-            </a:r>
-          </a:p>
           <a:p>
             <a:pPr marL="0" indent="0">
               <a:buNone/>
@@ -4356,6 +4475,19 @@
             <a:pPr marL="0" indent="0">
               <a:buNone/>
             </a:pPr>
+            <a:endParaRPr lang="en-GB" sz="2100" dirty="0">
+              <a:solidFill>
+                <a:schemeClr val="bg1">
+                  <a:lumMod val="85000"/>
+                </a:schemeClr>
+              </a:solidFill>
+              <a:latin typeface="Century Gothic" panose="020B0502020202020204" pitchFamily="34" charset="0"/>
+            </a:endParaRPr>
+          </a:p>
+          <a:p>
+            <a:pPr marL="0" indent="0">
+              <a:buNone/>
+            </a:pPr>
             <a:r>
               <a:rPr lang="en-GB" sz="2100" dirty="0">
                 <a:solidFill>
@@ -4414,6 +4546,19 @@
             <a:pPr marL="0" indent="0">
               <a:buNone/>
             </a:pPr>
+            <a:endParaRPr lang="en-GB" sz="2100" dirty="0">
+              <a:solidFill>
+                <a:schemeClr val="bg1">
+                  <a:lumMod val="85000"/>
+                </a:schemeClr>
+              </a:solidFill>
+              <a:latin typeface="Century Gothic" panose="020B0502020202020204" pitchFamily="34" charset="0"/>
+            </a:endParaRPr>
+          </a:p>
+          <a:p>
+            <a:pPr marL="0" indent="0">
+              <a:buNone/>
+            </a:pPr>
             <a:r>
               <a:rPr lang="en-GB" sz="2100" dirty="0">
                 <a:solidFill>
@@ -4478,7 +4623,7 @@
         </p:nvSpPr>
         <p:spPr>
           <a:xfrm>
-            <a:off x="609600" y="427038"/>
+            <a:off x="539552" y="0"/>
             <a:ext cx="8229600" cy="1143000"/>
           </a:xfrm>
           <a:prstGeom prst="rect">
@@ -4506,35 +4651,18 @@
             </a:lvl1pPr>
           </a:lstStyle>
           <a:p>
-            <a:r>
-              <a:rPr lang="en-US" b="1">
-                <a:solidFill>
-                  <a:srgbClr val="A5D11C"/>
-                </a:solidFill>
-                <a:effectLst>
-                  <a:outerShdw blurRad="38100" dist="38100" dir="2700000" algn="tl">
-                    <a:srgbClr val="000000">
-                      <a:alpha val="43137"/>
-                    </a:srgbClr>
-                  </a:outerShdw>
-                </a:effectLst>
-                <a:latin typeface="Century Gothic" panose="020B0502020202020204" pitchFamily="34" charset="0"/>
-              </a:rPr>
-              <a:t>3-Act Structure</a:t>
-            </a:r>
-            <a:endParaRPr lang="en-US" b="1" dirty="0">
-              <a:solidFill>
-                <a:srgbClr val="A5D11C"/>
-              </a:solidFill>
-              <a:effectLst>
-                <a:outerShdw blurRad="38100" dist="38100" dir="2700000" algn="tl">
-                  <a:srgbClr val="000000">
-                    <a:alpha val="43137"/>
-                  </a:srgbClr>
-                </a:outerShdw>
-              </a:effectLst>
-              <a:latin typeface="Century Gothic" panose="020B0502020202020204" pitchFamily="34" charset="0"/>
-            </a:endParaRPr>
+            <a:pPr marL="0" indent="0">
+              <a:buNone/>
+            </a:pPr>
+            <a:r>
+              <a:rPr lang="en-GB" sz="3200" b="1" dirty="0">
+                <a:solidFill>
+                  <a:srgbClr val="FF6600"/>
+                </a:solidFill>
+                <a:latin typeface="Century Gothic" panose="020B0502020202020204" pitchFamily="34" charset="0"/>
+              </a:rPr>
+              <a:t>Act 1 (Set Up)</a:t>
+            </a:r>
           </a:p>
         </p:txBody>
       </p:sp>
@@ -4552,8 +4680,8 @@
         </p:nvSpPr>
         <p:spPr>
           <a:xfrm>
-            <a:off x="755576" y="2402304"/>
-            <a:ext cx="7488832" cy="461665"/>
+            <a:off x="827584" y="1726725"/>
+            <a:ext cx="7488832" cy="1015663"/>
           </a:xfrm>
           <a:prstGeom prst="rect">
             <a:avLst/>
@@ -4569,34 +4697,79 @@
           <a:lstStyle/>
           <a:p>
             <a:r>
+              <a:rPr lang="en-US" sz="1200" strike="sngStrike" dirty="0">
+                <a:solidFill>
+                  <a:schemeClr val="bg1">
+                    <a:lumMod val="65000"/>
+                  </a:schemeClr>
+                </a:solidFill>
+                <a:latin typeface="Century Gothic" panose="020B0502020202020204" pitchFamily="34" charset="0"/>
+              </a:rPr>
+              <a:t>Once upon a time, there was a farmer. Farmer man do farmer things </a:t>
+            </a:r>
+            <a:r>
+              <a:rPr lang="en-US" sz="1200" strike="sngStrike" dirty="0" err="1">
+                <a:solidFill>
+                  <a:schemeClr val="bg1">
+                    <a:lumMod val="65000"/>
+                  </a:schemeClr>
+                </a:solidFill>
+                <a:latin typeface="Century Gothic" panose="020B0502020202020204" pitchFamily="34" charset="0"/>
+              </a:rPr>
+              <a:t>lul</a:t>
+            </a:r>
+            <a:r>
+              <a:rPr lang="en-US" sz="1200" strike="sngStrike" dirty="0">
+                <a:solidFill>
+                  <a:schemeClr val="bg1">
+                    <a:lumMod val="65000"/>
+                  </a:schemeClr>
+                </a:solidFill>
+                <a:latin typeface="Century Gothic" panose="020B0502020202020204" pitchFamily="34" charset="0"/>
+              </a:rPr>
+              <a:t>. </a:t>
+            </a:r>
+            <a:r>
+              <a:rPr lang="en-US" sz="1200" strike="sngStrike" dirty="0" err="1">
+                <a:solidFill>
+                  <a:schemeClr val="bg1">
+                    <a:lumMod val="65000"/>
+                  </a:schemeClr>
+                </a:solidFill>
+                <a:latin typeface="Century Gothic" panose="020B0502020202020204" pitchFamily="34" charset="0"/>
+              </a:rPr>
+              <a:t>Jk</a:t>
+            </a:r>
+            <a:r>
+              <a:rPr lang="en-US" sz="1200" strike="sngStrike" dirty="0">
+                <a:solidFill>
+                  <a:schemeClr val="bg1">
+                    <a:lumMod val="65000"/>
+                  </a:schemeClr>
+                </a:solidFill>
+                <a:latin typeface="Century Gothic" panose="020B0502020202020204" pitchFamily="34" charset="0"/>
+              </a:rPr>
+              <a:t> he tills the land himself and hunts predators approaching farm animals. He has a chill countryside life I guess </a:t>
+            </a:r>
+            <a:r>
               <a:rPr lang="en-US" sz="1200" dirty="0">
-                <a:latin typeface="Century Gothic" panose="020B0502020202020204" pitchFamily="34" charset="0"/>
-              </a:rPr>
-              <a:t>Once upon a time, there was a farmer. Farmer man do farmer things </a:t>
-            </a:r>
-            <a:r>
-              <a:rPr lang="en-US" sz="1200" dirty="0" err="1">
-                <a:latin typeface="Century Gothic" panose="020B0502020202020204" pitchFamily="34" charset="0"/>
-              </a:rPr>
-              <a:t>lul</a:t>
-            </a:r>
+                <a:solidFill>
+                  <a:schemeClr val="tx2">
+                    <a:lumMod val="60000"/>
+                    <a:lumOff val="40000"/>
+                  </a:schemeClr>
+                </a:solidFill>
+                <a:latin typeface="Century Gothic" panose="020B0502020202020204" pitchFamily="34" charset="0"/>
+              </a:rPr>
+              <a:t>(scuffed format, am rewriting)</a:t>
+            </a:r>
+          </a:p>
+          <a:p>
             <a:r>
               <a:rPr lang="en-US" sz="1200" dirty="0">
                 <a:latin typeface="Century Gothic" panose="020B0502020202020204" pitchFamily="34" charset="0"/>
               </a:rPr>
-              <a:t>. </a:t>
-            </a:r>
-            <a:r>
-              <a:rPr lang="en-US" sz="1200" dirty="0" err="1">
-                <a:latin typeface="Century Gothic" panose="020B0502020202020204" pitchFamily="34" charset="0"/>
-              </a:rPr>
-              <a:t>Jk</a:t>
-            </a:r>
-            <a:r>
-              <a:rPr lang="en-US" sz="1200" dirty="0">
-                <a:latin typeface="Century Gothic" panose="020B0502020202020204" pitchFamily="34" charset="0"/>
-              </a:rPr>
-              <a:t> he tills the land himself and hunts predators approaching farm animals. He has a chill countryside life I guess</a:t>
+              <a:t>Once upon a time, there was a farmer in a village. He lives a peaceful and relaxing life everyday, tending to his crops and protecting his farm animals from predators</a:t>
             </a:r>
           </a:p>
         </p:txBody>
@@ -4615,8 +4788,8 @@
         </p:nvSpPr>
         <p:spPr>
           <a:xfrm>
-            <a:off x="755576" y="3934797"/>
-            <a:ext cx="7488832" cy="276999"/>
+            <a:off x="755577" y="3646765"/>
+            <a:ext cx="7488832" cy="830997"/>
           </a:xfrm>
           <a:prstGeom prst="rect">
             <a:avLst/>
@@ -4632,28 +4805,92 @@
           <a:lstStyle/>
           <a:p>
             <a:r>
+              <a:rPr lang="en-US" sz="1200" strike="sngStrike" dirty="0" err="1">
+                <a:solidFill>
+                  <a:schemeClr val="bg1">
+                    <a:lumMod val="50000"/>
+                  </a:schemeClr>
+                </a:solidFill>
+                <a:latin typeface="Century Gothic" panose="020B0502020202020204" pitchFamily="34" charset="0"/>
+              </a:rPr>
+              <a:t>Wahhhhh</a:t>
+            </a:r>
+            <a:r>
+              <a:rPr lang="en-US" sz="1200" strike="sngStrike" dirty="0">
+                <a:solidFill>
+                  <a:schemeClr val="bg1">
+                    <a:lumMod val="50000"/>
+                  </a:schemeClr>
+                </a:solidFill>
+                <a:latin typeface="Century Gothic" panose="020B0502020202020204" pitchFamily="34" charset="0"/>
+              </a:rPr>
+              <a:t> island go </a:t>
+            </a:r>
+            <a:r>
+              <a:rPr lang="en-US" sz="1200" strike="sngStrike" dirty="0" err="1">
+                <a:solidFill>
+                  <a:schemeClr val="bg1">
+                    <a:lumMod val="50000"/>
+                  </a:schemeClr>
+                </a:solidFill>
+                <a:latin typeface="Century Gothic" panose="020B0502020202020204" pitchFamily="34" charset="0"/>
+              </a:rPr>
+              <a:t>wheeeeeeeeee</a:t>
+            </a:r>
+            <a:r>
+              <a:rPr lang="en-US" sz="1200" strike="sngStrike" dirty="0">
+                <a:solidFill>
+                  <a:schemeClr val="bg1">
+                    <a:lumMod val="50000"/>
+                  </a:schemeClr>
+                </a:solidFill>
+                <a:latin typeface="Century Gothic" panose="020B0502020202020204" pitchFamily="34" charset="0"/>
+              </a:rPr>
+              <a:t> and float into the sky</a:t>
+            </a:r>
+          </a:p>
+          <a:p>
+            <a:r>
+              <a:rPr lang="en-US" sz="1200" dirty="0">
+                <a:latin typeface="Century Gothic" panose="020B0502020202020204" pitchFamily="34" charset="0"/>
+              </a:rPr>
+              <a:t>Until one day, a violent earthquake shook the village and the castle of a nearby city was seen floating up into the sky </a:t>
+            </a:r>
+            <a:r>
+              <a:rPr lang="en-US" sz="1200" dirty="0">
+                <a:solidFill>
+                  <a:schemeClr val="tx2">
+                    <a:lumMod val="60000"/>
+                    <a:lumOff val="40000"/>
+                  </a:schemeClr>
+                </a:solidFill>
+                <a:latin typeface="Century Gothic" panose="020B0502020202020204" pitchFamily="34" charset="0"/>
+              </a:rPr>
+              <a:t>(</a:t>
+            </a:r>
+            <a:r>
               <a:rPr lang="en-US" sz="1200" dirty="0" err="1">
-                <a:latin typeface="Century Gothic" panose="020B0502020202020204" pitchFamily="34" charset="0"/>
-              </a:rPr>
-              <a:t>Wahhhhh</a:t>
+                <a:solidFill>
+                  <a:schemeClr val="tx2">
+                    <a:lumMod val="60000"/>
+                    <a:lumOff val="40000"/>
+                  </a:schemeClr>
+                </a:solidFill>
+                <a:latin typeface="Century Gothic" panose="020B0502020202020204" pitchFamily="34" charset="0"/>
+              </a:rPr>
+              <a:t>kinda</a:t>
             </a:r>
             <a:r>
               <a:rPr lang="en-US" sz="1200" dirty="0">
-                <a:latin typeface="Century Gothic" panose="020B0502020202020204" pitchFamily="34" charset="0"/>
-              </a:rPr>
-              <a:t> island go </a:t>
-            </a:r>
-            <a:r>
-              <a:rPr lang="en-US" sz="1200" dirty="0" err="1">
-                <a:latin typeface="Century Gothic" panose="020B0502020202020204" pitchFamily="34" charset="0"/>
-              </a:rPr>
-              <a:t>wheeeeeeeeee</a:t>
-            </a:r>
-            <a:r>
-              <a:rPr lang="en-US" sz="1200" dirty="0">
-                <a:latin typeface="Century Gothic" panose="020B0502020202020204" pitchFamily="34" charset="0"/>
-              </a:rPr>
-              <a:t> and float into the sky</a:t>
+                <a:solidFill>
+                  <a:schemeClr val="tx2">
+                    <a:lumMod val="60000"/>
+                    <a:lumOff val="40000"/>
+                  </a:schemeClr>
+                </a:solidFill>
+                <a:latin typeface="Century Gothic" panose="020B0502020202020204" pitchFamily="34" charset="0"/>
+              </a:rPr>
+              <a:t> want to describe the state of the village but I probably should put it in plot or pinch?)</a:t>
             </a:r>
           </a:p>
         </p:txBody>
@@ -4672,8 +4909,8 @@
         </p:nvSpPr>
         <p:spPr>
           <a:xfrm>
-            <a:off x="755576" y="5393713"/>
-            <a:ext cx="7488832" cy="276999"/>
+            <a:off x="724137" y="5486244"/>
+            <a:ext cx="7488832" cy="1200329"/>
           </a:xfrm>
           <a:prstGeom prst="rect">
             <a:avLst/>
@@ -4689,10 +4926,136 @@
           <a:lstStyle/>
           <a:p>
             <a:r>
+              <a:rPr lang="en-US" sz="1200" strike="sngStrike" dirty="0">
+                <a:solidFill>
+                  <a:schemeClr val="bg1">
+                    <a:lumMod val="50000"/>
+                  </a:schemeClr>
+                </a:solidFill>
+                <a:latin typeface="Century Gothic" panose="020B0502020202020204" pitchFamily="34" charset="0"/>
+              </a:rPr>
+              <a:t>All Villagers except main character suddenly collapse </a:t>
+            </a:r>
+            <a:r>
               <a:rPr lang="en-US" sz="1200" dirty="0">
-                <a:latin typeface="Century Gothic" panose="020B0502020202020204" pitchFamily="34" charset="0"/>
-              </a:rPr>
-              <a:t>All Villagers except main character suddenly collapse</a:t>
+                <a:solidFill>
+                  <a:schemeClr val="tx2">
+                    <a:lumMod val="60000"/>
+                    <a:lumOff val="40000"/>
+                  </a:schemeClr>
+                </a:solidFill>
+                <a:latin typeface="Century Gothic" panose="020B0502020202020204" pitchFamily="34" charset="0"/>
+              </a:rPr>
+              <a:t>(am rewriting to include how earthquake affected village)</a:t>
+            </a:r>
+          </a:p>
+          <a:p>
+            <a:r>
+              <a:rPr lang="en-US" sz="1200" dirty="0">
+                <a:latin typeface="Century Gothic" panose="020B0502020202020204" pitchFamily="34" charset="0"/>
+              </a:rPr>
+              <a:t>The farmer was able to survive the earthquake unscathed, but his land was severely damaged by the shaking. He rushes to check on his fellow villagers, only to watch them all falling to the ground one by one, unconscious. </a:t>
+            </a:r>
+            <a:r>
+              <a:rPr lang="en-US" sz="1200" dirty="0">
+                <a:solidFill>
+                  <a:schemeClr val="tx2">
+                    <a:lumMod val="60000"/>
+                    <a:lumOff val="40000"/>
+                  </a:schemeClr>
+                </a:solidFill>
+                <a:latin typeface="Century Gothic" panose="020B0502020202020204" pitchFamily="34" charset="0"/>
+              </a:rPr>
+              <a:t>(idk how say </a:t>
+            </a:r>
+            <a:r>
+              <a:rPr lang="en-US" sz="1200" dirty="0" err="1">
+                <a:solidFill>
+                  <a:schemeClr val="tx2">
+                    <a:lumMod val="60000"/>
+                    <a:lumOff val="40000"/>
+                  </a:schemeClr>
+                </a:solidFill>
+                <a:latin typeface="Century Gothic" panose="020B0502020202020204" pitchFamily="34" charset="0"/>
+              </a:rPr>
+              <a:t>uhhhhh</a:t>
+            </a:r>
+            <a:r>
+              <a:rPr lang="en-US" sz="1200" dirty="0">
+                <a:solidFill>
+                  <a:schemeClr val="tx2">
+                    <a:lumMod val="60000"/>
+                    <a:lumOff val="40000"/>
+                  </a:schemeClr>
+                </a:solidFill>
+                <a:latin typeface="Century Gothic" panose="020B0502020202020204" pitchFamily="34" charset="0"/>
+              </a:rPr>
+              <a:t>, I guess it’s the part where their core being stolen be the pinch?)</a:t>
+            </a:r>
+          </a:p>
+        </p:txBody>
+      </p:sp>
+      <p:sp>
+        <p:nvSpPr>
+          <p:cNvPr id="2" name="Rectangle: Rounded Corners 1">
+            <a:extLst>
+              <a:ext uri="{FF2B5EF4-FFF2-40B4-BE49-F238E27FC236}">
+                <a16:creationId xmlns:a16="http://schemas.microsoft.com/office/drawing/2014/main" id="{9ED74674-A0EF-2F47-9E5E-68A69340AE12}"/>
+              </a:ext>
+            </a:extLst>
+          </p:cNvPr>
+          <p:cNvSpPr/>
+          <p:nvPr/>
+        </p:nvSpPr>
+        <p:spPr>
+          <a:xfrm rot="21086446">
+            <a:off x="5699139" y="575595"/>
+            <a:ext cx="2786284" cy="840327"/>
+          </a:xfrm>
+          <a:prstGeom prst="roundRect">
+            <a:avLst/>
+          </a:prstGeom>
+          <a:solidFill>
+            <a:schemeClr val="accent6">
+              <a:lumMod val="60000"/>
+              <a:lumOff val="40000"/>
+            </a:schemeClr>
+          </a:solidFill>
+          <a:ln>
+            <a:noFill/>
+          </a:ln>
+        </p:spPr>
+        <p:style>
+          <a:lnRef idx="2">
+            <a:schemeClr val="accent1">
+              <a:shade val="15000"/>
+            </a:schemeClr>
+          </a:lnRef>
+          <a:fillRef idx="1">
+            <a:schemeClr val="accent1"/>
+          </a:fillRef>
+          <a:effectRef idx="0">
+            <a:schemeClr val="accent1"/>
+          </a:effectRef>
+          <a:fontRef idx="minor">
+            <a:schemeClr val="lt1"/>
+          </a:fontRef>
+        </p:style>
+        <p:txBody>
+          <a:bodyPr rtlCol="0" anchor="ctr"/>
+          <a:lstStyle/>
+          <a:p>
+            <a:pPr algn="ctr"/>
+            <a:r>
+              <a:rPr lang="en-SG" dirty="0">
+                <a:solidFill>
+                  <a:schemeClr val="tx2">
+                    <a:lumMod val="60000"/>
+                    <a:lumOff val="40000"/>
+                  </a:schemeClr>
+                </a:solidFill>
+              </a:rPr>
+              <a:t>if this was in game, it would be opening cutscene I guess</a:t>
             </a:r>
           </a:p>
         </p:txBody>
@@ -4739,7 +5102,7 @@
         </p:nvSpPr>
         <p:spPr>
           <a:xfrm>
-            <a:off x="457198" y="1268760"/>
+            <a:off x="611560" y="995128"/>
             <a:ext cx="8229602" cy="5184576"/>
           </a:xfrm>
         </p:spPr>
@@ -4748,20 +5111,6 @@
             <a:normAutofit/>
           </a:bodyPr>
           <a:lstStyle/>
-          <a:p>
-            <a:pPr marL="0" indent="0">
-              <a:buNone/>
-            </a:pPr>
-            <a:r>
-              <a:rPr lang="en-GB" sz="2100" b="1" dirty="0">
-                <a:solidFill>
-                  <a:srgbClr val="FF6600"/>
-                </a:solidFill>
-                <a:latin typeface="Century Gothic" panose="020B0502020202020204" pitchFamily="34" charset="0"/>
-              </a:rPr>
-              <a:t>Act 2 (Confrontation)</a:t>
-            </a:r>
-          </a:p>
           <a:p>
             <a:pPr marL="0" indent="0">
               <a:buNone/>
@@ -4832,44 +5181,6 @@
             <a:pPr marL="0" indent="0">
               <a:buNone/>
             </a:pPr>
-            <a:r>
-              <a:rPr lang="en-GB" sz="2100" dirty="0">
-                <a:solidFill>
-                  <a:schemeClr val="bg1">
-                    <a:lumMod val="85000"/>
-                  </a:schemeClr>
-                </a:solidFill>
-                <a:latin typeface="Century Gothic" panose="020B0502020202020204" pitchFamily="34" charset="0"/>
-              </a:rPr>
-              <a:t>5. Midpoint </a:t>
-            </a:r>
-          </a:p>
-          <a:p>
-            <a:pPr marL="0" indent="0">
-              <a:buNone/>
-            </a:pPr>
-            <a:r>
-              <a:rPr lang="en-GB" sz="2100" dirty="0">
-                <a:solidFill>
-                  <a:schemeClr val="bg1">
-                    <a:lumMod val="85000"/>
-                  </a:schemeClr>
-                </a:solidFill>
-                <a:latin typeface="Century Gothic" panose="020B0502020202020204" pitchFamily="34" charset="0"/>
-              </a:rPr>
-              <a:t>- </a:t>
-            </a:r>
-            <a:r>
-              <a:rPr lang="en-US" sz="2100" dirty="0">
-                <a:solidFill>
-                  <a:schemeClr val="bg1">
-                    <a:lumMod val="85000"/>
-                  </a:schemeClr>
-                </a:solidFill>
-                <a:latin typeface="Century Gothic" panose="020B0502020202020204" pitchFamily="34" charset="0"/>
-              </a:rPr>
-              <a:t>Character is close to solve the problem BUT…</a:t>
-            </a:r>
             <a:endParaRPr lang="en-GB" sz="2100" dirty="0">
               <a:solidFill>
                 <a:schemeClr val="bg1">
@@ -4905,6 +5216,502 @@
               <a:latin typeface="Century Gothic" panose="020B0502020202020204" pitchFamily="34" charset="0"/>
             </a:endParaRPr>
           </a:p>
+          <a:p>
+            <a:pPr marL="0" indent="0">
+              <a:buNone/>
+            </a:pPr>
+            <a:r>
+              <a:rPr lang="en-GB" sz="2100" dirty="0">
+                <a:solidFill>
+                  <a:schemeClr val="bg1">
+                    <a:lumMod val="85000"/>
+                  </a:schemeClr>
+                </a:solidFill>
+                <a:latin typeface="Century Gothic" panose="020B0502020202020204" pitchFamily="34" charset="0"/>
+              </a:rPr>
+              <a:t>5. Midpoint </a:t>
+            </a:r>
+          </a:p>
+          <a:p>
+            <a:pPr marL="0" indent="0">
+              <a:buNone/>
+            </a:pPr>
+            <a:r>
+              <a:rPr lang="en-GB" sz="2100" dirty="0">
+                <a:solidFill>
+                  <a:schemeClr val="bg1">
+                    <a:lumMod val="85000"/>
+                  </a:schemeClr>
+                </a:solidFill>
+                <a:latin typeface="Century Gothic" panose="020B0502020202020204" pitchFamily="34" charset="0"/>
+              </a:rPr>
+              <a:t>- </a:t>
+            </a:r>
+            <a:r>
+              <a:rPr lang="en-US" sz="2100" dirty="0">
+                <a:solidFill>
+                  <a:schemeClr val="bg1">
+                    <a:lumMod val="85000"/>
+                  </a:schemeClr>
+                </a:solidFill>
+                <a:latin typeface="Century Gothic" panose="020B0502020202020204" pitchFamily="34" charset="0"/>
+              </a:rPr>
+              <a:t>Character is close to solve the problem BUT…</a:t>
+            </a:r>
+            <a:endParaRPr lang="en-GB" sz="2100" dirty="0">
+              <a:solidFill>
+                <a:schemeClr val="bg1">
+                  <a:lumMod val="85000"/>
+                </a:schemeClr>
+              </a:solidFill>
+              <a:latin typeface="Century Gothic" panose="020B0502020202020204" pitchFamily="34" charset="0"/>
+            </a:endParaRPr>
+          </a:p>
+          <a:p>
+            <a:pPr marL="0" indent="0">
+              <a:buNone/>
+            </a:pPr>
+            <a:endParaRPr lang="en-GB" sz="2100" dirty="0">
+              <a:solidFill>
+                <a:schemeClr val="bg1">
+                  <a:lumMod val="85000"/>
+                </a:schemeClr>
+              </a:solidFill>
+              <a:latin typeface="Century Gothic" panose="020B0502020202020204" pitchFamily="34" charset="0"/>
+            </a:endParaRPr>
+          </a:p>
+          <a:p>
+            <a:pPr marL="0" indent="0">
+              <a:buNone/>
+            </a:pPr>
+            <a:endParaRPr lang="en-GB" sz="2100" dirty="0">
+              <a:solidFill>
+                <a:schemeClr val="bg1">
+                  <a:lumMod val="85000"/>
+                </a:schemeClr>
+              </a:solidFill>
+              <a:latin typeface="Century Gothic" panose="020B0502020202020204" pitchFamily="34" charset="0"/>
+            </a:endParaRPr>
+          </a:p>
+          <a:p>
+            <a:endParaRPr lang="en-US" sz="2100" dirty="0">
+              <a:solidFill>
+                <a:schemeClr val="bg1">
+                  <a:lumMod val="85000"/>
+                </a:schemeClr>
+              </a:solidFill>
+              <a:latin typeface="Century Gothic" panose="020B0502020202020204" pitchFamily="34" charset="0"/>
+            </a:endParaRPr>
+          </a:p>
+        </p:txBody>
+      </p:sp>
+      <p:sp>
+        <p:nvSpPr>
+          <p:cNvPr id="10" name="Title 4">
+            <a:extLst>
+              <a:ext uri="{FF2B5EF4-FFF2-40B4-BE49-F238E27FC236}">
+                <a16:creationId xmlns:a16="http://schemas.microsoft.com/office/drawing/2014/main" id="{BFE2E9F1-EEFD-4C45-AAA8-53A2F0435450}"/>
+              </a:ext>
+            </a:extLst>
+          </p:cNvPr>
+          <p:cNvSpPr>
+            <a:spLocks noGrp="1"/>
+          </p:cNvSpPr>
+          <p:nvPr>
+            <p:ph type="title"/>
+          </p:nvPr>
+        </p:nvSpPr>
+        <p:spPr>
+          <a:xfrm>
+            <a:off x="457200" y="274638"/>
+            <a:ext cx="7783354" cy="609328"/>
+          </a:xfrm>
+        </p:spPr>
+        <p:txBody>
+          <a:bodyPr>
+            <a:noAutofit/>
+          </a:bodyPr>
+          <a:lstStyle/>
+          <a:p>
+            <a:r>
+              <a:rPr lang="en-GB" sz="3200" b="1" dirty="0">
+                <a:solidFill>
+                  <a:srgbClr val="FF6600"/>
+                </a:solidFill>
+                <a:latin typeface="Century Gothic" panose="020B0502020202020204" pitchFamily="34" charset="0"/>
+              </a:rPr>
+              <a:t>Act 2 (Confrontation/ also gameplay part?)</a:t>
+            </a:r>
+            <a:endParaRPr lang="en-US" sz="3200" b="1" dirty="0">
+              <a:solidFill>
+                <a:srgbClr val="A5D11C"/>
+              </a:solidFill>
+              <a:effectLst>
+                <a:outerShdw blurRad="38100" dist="38100" dir="2700000" algn="tl">
+                  <a:srgbClr val="000000">
+                    <a:alpha val="43137"/>
+                  </a:srgbClr>
+                </a:outerShdw>
+              </a:effectLst>
+              <a:latin typeface="Century Gothic" panose="020B0502020202020204" pitchFamily="34" charset="0"/>
+            </a:endParaRPr>
+          </a:p>
+        </p:txBody>
+      </p:sp>
+      <p:sp>
+        <p:nvSpPr>
+          <p:cNvPr id="14" name="TextBox 13">
+            <a:extLst>
+              <a:ext uri="{FF2B5EF4-FFF2-40B4-BE49-F238E27FC236}">
+                <a16:creationId xmlns:a16="http://schemas.microsoft.com/office/drawing/2014/main" id="{47A5CFE1-1682-4D81-982A-930D56C037D6}"/>
+              </a:ext>
+            </a:extLst>
+          </p:cNvPr>
+          <p:cNvSpPr txBox="1"/>
+          <p:nvPr/>
+        </p:nvSpPr>
+        <p:spPr>
+          <a:xfrm>
+            <a:off x="909938" y="1738337"/>
+            <a:ext cx="7488832" cy="1754326"/>
+          </a:xfrm>
+          <a:prstGeom prst="rect">
+            <a:avLst/>
+          </a:prstGeom>
+          <a:solidFill>
+            <a:schemeClr val="bg1"/>
+          </a:solidFill>
+        </p:spPr>
+        <p:txBody>
+          <a:bodyPr wrap="square" rtlCol="0">
+            <a:spAutoFit/>
+          </a:bodyPr>
+          <a:lstStyle/>
+          <a:p>
+            <a:r>
+              <a:rPr lang="en-US" sz="1200" strike="sngStrike" dirty="0">
+                <a:solidFill>
+                  <a:schemeClr val="bg1">
+                    <a:lumMod val="50000"/>
+                  </a:schemeClr>
+                </a:solidFill>
+                <a:latin typeface="Century Gothic" panose="020B0502020202020204" pitchFamily="34" charset="0"/>
+              </a:rPr>
+              <a:t>Main character notices energy of villagers cores being sucked out and flying towards castle</a:t>
+            </a:r>
+          </a:p>
+          <a:p>
+            <a:r>
+              <a:rPr lang="en-US" sz="1200" strike="sngStrike" dirty="0">
+                <a:solidFill>
+                  <a:schemeClr val="bg1">
+                    <a:lumMod val="50000"/>
+                  </a:schemeClr>
+                </a:solidFill>
+                <a:latin typeface="Century Gothic" panose="020B0502020202020204" pitchFamily="34" charset="0"/>
+              </a:rPr>
+              <a:t>Main character notices he is only person unscathed</a:t>
+            </a:r>
+          </a:p>
+          <a:p>
+            <a:r>
+              <a:rPr lang="en-US" sz="1200" dirty="0">
+                <a:solidFill>
+                  <a:schemeClr val="tx2">
+                    <a:lumMod val="60000"/>
+                    <a:lumOff val="40000"/>
+                  </a:schemeClr>
+                </a:solidFill>
+                <a:latin typeface="Century Gothic" panose="020B0502020202020204" pitchFamily="34" charset="0"/>
+              </a:rPr>
+              <a:t>(core sucked out or only person standing come first O|&lt;</a:t>
+            </a:r>
+          </a:p>
+          <a:p>
+            <a:r>
+              <a:rPr lang="en-US" sz="1200" dirty="0">
+                <a:solidFill>
+                  <a:schemeClr val="tx2">
+                    <a:lumMod val="60000"/>
+                    <a:lumOff val="40000"/>
+                  </a:schemeClr>
+                </a:solidFill>
+                <a:latin typeface="Century Gothic" panose="020B0502020202020204" pitchFamily="34" charset="0"/>
+              </a:rPr>
+              <a:t>I guess he can have a dramatic moment of surveying the surroundings before things get even worse)</a:t>
+            </a:r>
+          </a:p>
+          <a:p>
+            <a:r>
+              <a:rPr lang="en-US" sz="1200" dirty="0">
+                <a:solidFill>
+                  <a:schemeClr val="tx1">
+                    <a:lumMod val="95000"/>
+                    <a:lumOff val="5000"/>
+                  </a:schemeClr>
+                </a:solidFill>
+                <a:latin typeface="Century Gothic" panose="020B0502020202020204" pitchFamily="34" charset="0"/>
+              </a:rPr>
+              <a:t>The farmer stands and surveys his surroundings, shocked by the situation. He was the only person that is still awake in the entire village. Then, something caught his eyes. He notices the cores of his fellow villagers detaching and flying into the air, towards the castle. Without their cores, they will never wake up again!</a:t>
+            </a:r>
+          </a:p>
+        </p:txBody>
+      </p:sp>
+      <p:sp>
+        <p:nvSpPr>
+          <p:cNvPr id="15" name="TextBox 14">
+            <a:extLst>
+              <a:ext uri="{FF2B5EF4-FFF2-40B4-BE49-F238E27FC236}">
+                <a16:creationId xmlns:a16="http://schemas.microsoft.com/office/drawing/2014/main" id="{F50DF93C-1AA7-416A-9F49-147229EE15BB}"/>
+              </a:ext>
+            </a:extLst>
+          </p:cNvPr>
+          <p:cNvSpPr txBox="1"/>
+          <p:nvPr/>
+        </p:nvSpPr>
+        <p:spPr>
+          <a:xfrm>
+            <a:off x="906084" y="4521943"/>
+            <a:ext cx="7488832" cy="2123658"/>
+          </a:xfrm>
+          <a:prstGeom prst="rect">
+            <a:avLst/>
+          </a:prstGeom>
+          <a:solidFill>
+            <a:schemeClr val="bg1"/>
+          </a:solidFill>
+        </p:spPr>
+        <p:txBody>
+          <a:bodyPr wrap="square" rtlCol="0">
+            <a:spAutoFit/>
+          </a:bodyPr>
+          <a:lstStyle/>
+          <a:p>
+            <a:r>
+              <a:rPr lang="en-US" sz="1200" dirty="0">
+                <a:solidFill>
+                  <a:schemeClr val="tx2">
+                    <a:lumMod val="60000"/>
+                    <a:lumOff val="40000"/>
+                  </a:schemeClr>
+                </a:solidFill>
+                <a:latin typeface="Century Gothic" panose="020B0502020202020204" pitchFamily="34" charset="0"/>
+              </a:rPr>
+              <a:t>(cant solve problem, but possible to change context from helpless to having power to save them)</a:t>
+            </a:r>
+          </a:p>
+          <a:p>
+            <a:r>
+              <a:rPr lang="en-US" sz="1200" strike="sngStrike" dirty="0">
+                <a:solidFill>
+                  <a:schemeClr val="bg1">
+                    <a:lumMod val="50000"/>
+                  </a:schemeClr>
+                </a:solidFill>
+                <a:latin typeface="Century Gothic" panose="020B0502020202020204" pitchFamily="34" charset="0"/>
+              </a:rPr>
+              <a:t>Suddenly a voice spoke to him </a:t>
+            </a:r>
+            <a:r>
+              <a:rPr lang="en-US" sz="1200" dirty="0">
+                <a:solidFill>
+                  <a:schemeClr val="tx2">
+                    <a:lumMod val="60000"/>
+                    <a:lumOff val="40000"/>
+                  </a:schemeClr>
+                </a:solidFill>
+                <a:latin typeface="Century Gothic" panose="020B0502020202020204" pitchFamily="34" charset="0"/>
+              </a:rPr>
+              <a:t>(seems kind of convenient and cliché :p. honestly though, being the only one left unscathed is already way too convenient to happen. </a:t>
+            </a:r>
+            <a:r>
+              <a:rPr lang="en-US" sz="1200" dirty="0" err="1">
+                <a:solidFill>
+                  <a:schemeClr val="tx2">
+                    <a:lumMod val="60000"/>
+                    <a:lumOff val="40000"/>
+                  </a:schemeClr>
+                </a:solidFill>
+                <a:latin typeface="Century Gothic" panose="020B0502020202020204" pitchFamily="34" charset="0"/>
+              </a:rPr>
+              <a:t>Ahahaha</a:t>
+            </a:r>
+            <a:r>
+              <a:rPr lang="en-US" sz="1200" dirty="0">
+                <a:solidFill>
+                  <a:schemeClr val="tx2">
+                    <a:lumMod val="60000"/>
+                    <a:lumOff val="40000"/>
+                  </a:schemeClr>
+                </a:solidFill>
+                <a:latin typeface="Century Gothic" panose="020B0502020202020204" pitchFamily="34" charset="0"/>
+              </a:rPr>
+              <a:t> standard issue fairy tale this is O|&lt;. Anyways, receiving power from god can be inciting incident, story qn be if main character can save the world [</a:t>
+            </a:r>
+            <a:r>
+              <a:rPr lang="en-US" sz="1200" dirty="0" err="1">
+                <a:solidFill>
+                  <a:schemeClr val="tx2">
+                    <a:lumMod val="60000"/>
+                    <a:lumOff val="40000"/>
+                  </a:schemeClr>
+                </a:solidFill>
+                <a:latin typeface="Century Gothic" panose="020B0502020202020204" pitchFamily="34" charset="0"/>
+              </a:rPr>
+              <a:t>sinces</a:t>
+            </a:r>
+            <a:r>
+              <a:rPr lang="en-US" sz="1200" dirty="0">
+                <a:solidFill>
+                  <a:schemeClr val="tx2">
+                    <a:lumMod val="60000"/>
+                    <a:lumOff val="40000"/>
+                  </a:schemeClr>
+                </a:solidFill>
+                <a:latin typeface="Century Gothic" panose="020B0502020202020204" pitchFamily="34" charset="0"/>
+              </a:rPr>
+              <a:t> </a:t>
+            </a:r>
+            <a:r>
+              <a:rPr lang="en-US" sz="1200" dirty="0" err="1">
+                <a:solidFill>
+                  <a:schemeClr val="tx2">
+                    <a:lumMod val="60000"/>
+                    <a:lumOff val="40000"/>
+                  </a:schemeClr>
+                </a:solidFill>
+                <a:latin typeface="Century Gothic" panose="020B0502020202020204" pitchFamily="34" charset="0"/>
+              </a:rPr>
+              <a:t>hes</a:t>
+            </a:r>
+            <a:r>
+              <a:rPr lang="en-US" sz="1200" dirty="0">
+                <a:solidFill>
+                  <a:schemeClr val="tx2">
+                    <a:lumMod val="60000"/>
+                    <a:lumOff val="40000"/>
+                  </a:schemeClr>
+                </a:solidFill>
+                <a:latin typeface="Century Gothic" panose="020B0502020202020204" pitchFamily="34" charset="0"/>
+              </a:rPr>
+              <a:t> the only one that received powers]. Would be funny if he has magical girl transformation though.) </a:t>
+            </a:r>
+          </a:p>
+          <a:p>
+            <a:r>
+              <a:rPr lang="en-US" sz="1200" dirty="0">
+                <a:solidFill>
+                  <a:schemeClr val="tx1">
+                    <a:lumMod val="95000"/>
+                    <a:lumOff val="5000"/>
+                  </a:schemeClr>
+                </a:solidFill>
+                <a:latin typeface="Century Gothic" panose="020B0502020202020204" pitchFamily="34" charset="0"/>
+              </a:rPr>
+              <a:t>Suddenly, a voice calls him and introduces themselves as the god. God tells him that a vengeful spirit had invaded the castle and stole the kingdoms powers. </a:t>
+            </a:r>
+            <a:r>
+              <a:rPr lang="en-US" sz="1200" dirty="0">
+                <a:solidFill>
+                  <a:schemeClr val="tx2">
+                    <a:lumMod val="60000"/>
+                    <a:lumOff val="40000"/>
+                  </a:schemeClr>
+                </a:solidFill>
+                <a:latin typeface="Century Gothic" panose="020B0502020202020204" pitchFamily="34" charset="0"/>
+              </a:rPr>
+              <a:t>(yes it’s an ancient kingdom and its called </a:t>
+            </a:r>
+            <a:r>
+              <a:rPr lang="en-US" sz="1200" dirty="0" err="1">
+                <a:solidFill>
+                  <a:schemeClr val="tx2">
+                    <a:lumMod val="60000"/>
+                    <a:lumOff val="40000"/>
+                  </a:schemeClr>
+                </a:solidFill>
+                <a:latin typeface="Century Gothic" panose="020B0502020202020204" pitchFamily="34" charset="0"/>
+              </a:rPr>
+              <a:t>gravidia</a:t>
+            </a:r>
+            <a:r>
+              <a:rPr lang="en-US" sz="1200" dirty="0">
+                <a:solidFill>
+                  <a:schemeClr val="tx2">
+                    <a:lumMod val="60000"/>
+                    <a:lumOff val="40000"/>
+                  </a:schemeClr>
+                </a:solidFill>
+                <a:latin typeface="Century Gothic" panose="020B0502020202020204" pitchFamily="34" charset="0"/>
+              </a:rPr>
+              <a:t> lmao</a:t>
+            </a:r>
+            <a:r>
+              <a:rPr lang="en-US" sz="1200" dirty="0">
+                <a:solidFill>
+                  <a:schemeClr val="tx1">
+                    <a:lumMod val="95000"/>
+                    <a:lumOff val="5000"/>
+                  </a:schemeClr>
+                </a:solidFill>
+                <a:latin typeface="Century Gothic" panose="020B0502020202020204" pitchFamily="34" charset="0"/>
+              </a:rPr>
+              <a:t>) he was a tyrant that wanted to sacrifice his people for more power, but he died before he could do so. Now he has freed himself from god and came back to wreak havoc. Farmer gets gods power to defeat the spirit.</a:t>
+            </a:r>
+          </a:p>
+        </p:txBody>
+      </p:sp>
+    </p:spTree>
+    <p:extLst>
+      <p:ext uri="{BB962C8B-B14F-4D97-AF65-F5344CB8AC3E}">
+        <p14:creationId xmlns:p14="http://schemas.microsoft.com/office/powerpoint/2010/main" val="43252694"/>
+      </p:ext>
+    </p:extLst>
+  </p:cSld>
+  <p:clrMapOvr>
+    <a:masterClrMapping/>
+  </p:clrMapOvr>
+</p:sld>
+</file>
+
+<file path=ppt/slides/slide4.xml><?xml version="1.0" encoding="utf-8"?>
+<p:sld xmlns:a="http://schemas.openxmlformats.org/drawingml/2006/main" xmlns:r="http://schemas.openxmlformats.org/officeDocument/2006/relationships" xmlns:p="http://schemas.openxmlformats.org/presentationml/2006/main">
+  <p:cSld>
+    <p:spTree>
+      <p:nvGrpSpPr>
+        <p:cNvPr id="1" name=""/>
+        <p:cNvGrpSpPr/>
+        <p:nvPr/>
+      </p:nvGrpSpPr>
+      <p:grpSpPr>
+        <a:xfrm>
+          <a:off x="0" y="0"/>
+          <a:ext cx="0" cy="0"/>
+          <a:chOff x="0" y="0"/>
+          <a:chExt cx="0" cy="0"/>
+        </a:xfrm>
+      </p:grpSpPr>
+      <p:sp>
+        <p:nvSpPr>
+          <p:cNvPr id="3" name="Content Placeholder 2"/>
+          <p:cNvSpPr>
+            <a:spLocks noGrp="1"/>
+          </p:cNvSpPr>
+          <p:nvPr>
+            <p:ph idx="1"/>
+          </p:nvPr>
+        </p:nvSpPr>
+        <p:spPr>
+          <a:xfrm>
+            <a:off x="611560" y="995128"/>
+            <a:ext cx="8229602" cy="5184576"/>
+          </a:xfrm>
+        </p:spPr>
+        <p:txBody>
+          <a:bodyPr>
+            <a:normAutofit/>
+          </a:bodyPr>
+          <a:lstStyle/>
           <a:p>
             <a:pPr marL="0" indent="0">
               <a:buNone/>
@@ -5003,131 +5810,37 @@
         <p:spPr>
           <a:xfrm>
             <a:off x="457200" y="274638"/>
-            <a:ext cx="8229600" cy="1143000"/>
+            <a:ext cx="7783354" cy="609328"/>
           </a:xfrm>
         </p:spPr>
         <p:txBody>
-          <a:bodyPr/>
-          <a:lstStyle/>
-          <a:p>
-            <a:r>
-              <a:rPr lang="en-US" b="1" dirty="0">
-                <a:solidFill>
-                  <a:srgbClr val="A5D11C"/>
-                </a:solidFill>
-                <a:effectLst>
-                  <a:outerShdw blurRad="38100" dist="38100" dir="2700000" algn="tl">
-                    <a:srgbClr val="000000">
-                      <a:alpha val="43137"/>
-                    </a:srgbClr>
-                  </a:outerShdw>
-                </a:effectLst>
-                <a:latin typeface="Century Gothic" panose="020B0502020202020204" pitchFamily="34" charset="0"/>
-              </a:rPr>
-              <a:t>3-Act Structure</a:t>
-            </a:r>
-          </a:p>
-        </p:txBody>
-      </p:sp>
-      <p:sp>
-        <p:nvSpPr>
-          <p:cNvPr id="14" name="TextBox 13">
-            <a:extLst>
-              <a:ext uri="{FF2B5EF4-FFF2-40B4-BE49-F238E27FC236}">
-                <a16:creationId xmlns:a16="http://schemas.microsoft.com/office/drawing/2014/main" id="{47A5CFE1-1682-4D81-982A-930D56C037D6}"/>
-              </a:ext>
-            </a:extLst>
-          </p:cNvPr>
-          <p:cNvSpPr txBox="1"/>
-          <p:nvPr/>
-        </p:nvSpPr>
-        <p:spPr>
-          <a:xfrm>
-            <a:off x="755184" y="2472011"/>
-            <a:ext cx="7488832" cy="461665"/>
-          </a:xfrm>
-          <a:prstGeom prst="rect">
-            <a:avLst/>
-          </a:prstGeom>
-          <a:solidFill>
-            <a:schemeClr val="bg1"/>
-          </a:solidFill>
-        </p:spPr>
-        <p:txBody>
-          <a:bodyPr wrap="square" rtlCol="0">
-            <a:spAutoFit/>
+          <a:bodyPr>
+            <a:noAutofit/>
           </a:bodyPr>
           <a:lstStyle/>
           <a:p>
             <a:r>
-              <a:rPr lang="en-US" sz="1200" dirty="0">
-                <a:latin typeface="Century Gothic" panose="020B0502020202020204" pitchFamily="34" charset="0"/>
-              </a:rPr>
-              <a:t>Main character notices energy of villagers cores being sucked out and flying towards castle</a:t>
-            </a:r>
-          </a:p>
-          <a:p>
-            <a:r>
-              <a:rPr lang="en-US" sz="1200" dirty="0">
-                <a:latin typeface="Century Gothic" panose="020B0502020202020204" pitchFamily="34" charset="0"/>
-              </a:rPr>
-              <a:t>Main character notices he is only person unscathed</a:t>
-            </a:r>
-          </a:p>
-        </p:txBody>
-      </p:sp>
-      <p:sp>
-        <p:nvSpPr>
-          <p:cNvPr id="15" name="TextBox 14">
-            <a:extLst>
-              <a:ext uri="{FF2B5EF4-FFF2-40B4-BE49-F238E27FC236}">
-                <a16:creationId xmlns:a16="http://schemas.microsoft.com/office/drawing/2014/main" id="{F50DF93C-1AA7-416A-9F49-147229EE15BB}"/>
-              </a:ext>
-            </a:extLst>
-          </p:cNvPr>
-          <p:cNvSpPr txBox="1"/>
-          <p:nvPr/>
-        </p:nvSpPr>
-        <p:spPr>
-          <a:xfrm>
-            <a:off x="755576" y="3988049"/>
-            <a:ext cx="7488832" cy="646331"/>
-          </a:xfrm>
-          <a:prstGeom prst="rect">
-            <a:avLst/>
-          </a:prstGeom>
-          <a:solidFill>
-            <a:schemeClr val="bg1"/>
-          </a:solidFill>
-        </p:spPr>
-        <p:txBody>
-          <a:bodyPr wrap="square" rtlCol="0">
-            <a:spAutoFit/>
-          </a:bodyPr>
-          <a:lstStyle/>
-          <a:p>
-            <a:r>
-              <a:rPr lang="en-US" sz="1200" dirty="0">
-                <a:latin typeface="Century Gothic" panose="020B0502020202020204" pitchFamily="34" charset="0"/>
-              </a:rPr>
-              <a:t>???</a:t>
-            </a:r>
-          </a:p>
-          <a:p>
-            <a:r>
-              <a:rPr lang="en-US" sz="1200" dirty="0">
-                <a:latin typeface="Century Gothic" panose="020B0502020202020204" pitchFamily="34" charset="0"/>
-              </a:rPr>
-              <a:t>???</a:t>
-            </a:r>
-          </a:p>
-          <a:p>
-            <a:r>
-              <a:rPr lang="en-US" sz="1200" dirty="0">
-                <a:latin typeface="Century Gothic" panose="020B0502020202020204" pitchFamily="34" charset="0"/>
-              </a:rPr>
-              <a:t>???</a:t>
-            </a:r>
+              <a:rPr lang="en-GB" sz="3200" b="1" dirty="0">
+                <a:solidFill>
+                  <a:srgbClr val="FF6600"/>
+                </a:solidFill>
+                <a:latin typeface="Century Gothic" panose="020B0502020202020204" pitchFamily="34" charset="0"/>
+              </a:rPr>
+              <a:t>Act 2 (Confrontation/ also gameplay part?)</a:t>
+            </a:r>
+            <a:endParaRPr lang="en-US" sz="3200" b="1" dirty="0">
+              <a:solidFill>
+                <a:srgbClr val="A5D11C"/>
+              </a:solidFill>
+              <a:effectLst>
+                <a:outerShdw blurRad="38100" dist="38100" dir="2700000" algn="tl">
+                  <a:srgbClr val="000000">
+                    <a:alpha val="43137"/>
+                  </a:srgbClr>
+                </a:outerShdw>
+              </a:effectLst>
+              <a:latin typeface="Century Gothic" panose="020B0502020202020204" pitchFamily="34" charset="0"/>
+            </a:endParaRPr>
           </a:p>
         </p:txBody>
       </p:sp>
@@ -5145,8 +5858,8 @@
         </p:nvSpPr>
         <p:spPr>
           <a:xfrm>
-            <a:off x="755576" y="5518973"/>
-            <a:ext cx="7488832" cy="646331"/>
+            <a:off x="611560" y="1844824"/>
+            <a:ext cx="7488832" cy="830997"/>
           </a:xfrm>
           <a:prstGeom prst="rect">
             <a:avLst/>
@@ -5165,24 +5878,62 @@
               <a:rPr lang="en-US" sz="1200" dirty="0">
                 <a:latin typeface="Century Gothic" panose="020B0502020202020204" pitchFamily="34" charset="0"/>
               </a:rPr>
-              <a:t>???</a:t>
-            </a:r>
-          </a:p>
-          <a:p>
+              <a:t>(</a:t>
+            </a:r>
+            <a:r>
+              <a:rPr lang="en-US" sz="1200" dirty="0" err="1">
+                <a:latin typeface="Century Gothic" panose="020B0502020202020204" pitchFamily="34" charset="0"/>
+              </a:rPr>
+              <a:t>ooga</a:t>
+            </a:r>
             <a:r>
               <a:rPr lang="en-US" sz="1200" dirty="0">
                 <a:latin typeface="Century Gothic" panose="020B0502020202020204" pitchFamily="34" charset="0"/>
               </a:rPr>
-              <a:t>???</a:t>
-            </a:r>
-          </a:p>
-          <a:p>
+              <a:t> </a:t>
+            </a:r>
+            <a:r>
+              <a:rPr lang="en-US" sz="1200" dirty="0" err="1">
+                <a:latin typeface="Century Gothic" panose="020B0502020202020204" pitchFamily="34" charset="0"/>
+              </a:rPr>
+              <a:t>booga</a:t>
+            </a:r>
             <a:r>
               <a:rPr lang="en-US" sz="1200" dirty="0">
                 <a:latin typeface="Century Gothic" panose="020B0502020202020204" pitchFamily="34" charset="0"/>
               </a:rPr>
-              <a:t>???</a:t>
-            </a:r>
+              <a:t> actual gameplay part </a:t>
+            </a:r>
+            <a:r>
+              <a:rPr lang="en-US" sz="1200" dirty="0" err="1">
+                <a:latin typeface="Century Gothic" panose="020B0502020202020204" pitchFamily="34" charset="0"/>
+              </a:rPr>
+              <a:t>wheeeeee</a:t>
+            </a:r>
+            <a:endParaRPr lang="en-US" sz="1200" dirty="0">
+              <a:latin typeface="Century Gothic" panose="020B0502020202020204" pitchFamily="34" charset="0"/>
+            </a:endParaRPr>
+          </a:p>
+          <a:p>
+            <a:r>
+              <a:rPr lang="en-US" sz="1200" dirty="0">
+                <a:latin typeface="Century Gothic" panose="020B0502020202020204" pitchFamily="34" charset="0"/>
+              </a:rPr>
+              <a:t>Anyways, current story is hard to put in branching narratives :D</a:t>
+            </a:r>
+          </a:p>
+          <a:p>
+            <a:r>
+              <a:rPr lang="en-US" sz="1200">
+                <a:latin typeface="Century Gothic" panose="020B0502020202020204" pitchFamily="34" charset="0"/>
+              </a:rPr>
+              <a:t>Guess I perish)</a:t>
+            </a:r>
+          </a:p>
+          <a:p>
+            <a:endParaRPr lang="en-US" sz="1200" dirty="0">
+              <a:latin typeface="Century Gothic" panose="020B0502020202020204" pitchFamily="34" charset="0"/>
+            </a:endParaRPr>
           </a:p>
         </p:txBody>
       </p:sp>
@@ -5199,7 +5950,7 @@
 </p:sld>
 </file>
 
-<file path=ppt/slides/slide4.xml><?xml version="1.0" encoding="utf-8"?>
+<file path=ppt/slides/slide5.xml><?xml version="1.0" encoding="utf-8"?>
 <p:sld xmlns:a="http://schemas.openxmlformats.org/drawingml/2006/main" xmlns:r="http://schemas.openxmlformats.org/officeDocument/2006/relationships" xmlns:p="http://schemas.openxmlformats.org/presentationml/2006/main">
   <p:cSld>
     <p:spTree>

</xml_diff>

<commit_message>
story creation + iwp progress
story creation:
added rough synopsis

TODO:
identify key events
add 20 branching events

iwp:
shifted unreal project into folder for archiving (and monitor progress)

TODO:
add in an enemy
destroy enemy when bullet hits
add health and damage variables to bullet and enemy

DONE:
bullet destroys itself upon collision
</commit_message>
<xml_diff>
--- a/story creation/assignment submission/DM1374_GSTORY_3-ActTemplate (submission).pptx
+++ b/story creation/assignment submission/DM1374_GSTORY_3-ActTemplate (submission).pptx
@@ -5,7 +5,7 @@
     <p:sldMasterId id="2147483648" r:id="rId1"/>
   </p:sldMasterIdLst>
   <p:notesMasterIdLst>
-    <p:notesMasterId r:id="rId7"/>
+    <p:notesMasterId r:id="rId8"/>
   </p:notesMasterIdLst>
   <p:sldIdLst>
     <p:sldId id="395" r:id="rId2"/>
@@ -13,6 +13,7 @@
     <p:sldId id="401" r:id="rId4"/>
     <p:sldId id="396" r:id="rId5"/>
     <p:sldId id="397" r:id="rId6"/>
+    <p:sldId id="402" r:id="rId7"/>
   </p:sldIdLst>
   <p:sldSz cx="9144000" cy="6858000" type="screen4x3"/>
   <p:notesSz cx="6858000" cy="9144000"/>
@@ -5060,6 +5061,116 @@
           </a:p>
         </p:txBody>
       </p:sp>
+      <p:sp>
+        <p:nvSpPr>
+          <p:cNvPr id="4" name="TextBox 3">
+            <a:extLst>
+              <a:ext uri="{FF2B5EF4-FFF2-40B4-BE49-F238E27FC236}">
+                <a16:creationId xmlns:a16="http://schemas.microsoft.com/office/drawing/2014/main" id="{47A5CFE1-1682-4D81-982A-930D56C037D6}"/>
+              </a:ext>
+            </a:extLst>
+          </p:cNvPr>
+          <p:cNvSpPr txBox="1"/>
+          <p:nvPr/>
+        </p:nvSpPr>
+        <p:spPr>
+          <a:xfrm>
+            <a:off x="1403648" y="5744108"/>
+            <a:ext cx="7488832" cy="1754326"/>
+          </a:xfrm>
+          <a:prstGeom prst="rect">
+            <a:avLst/>
+          </a:prstGeom>
+          <a:solidFill>
+            <a:schemeClr val="bg1"/>
+          </a:solidFill>
+        </p:spPr>
+        <p:txBody>
+          <a:bodyPr wrap="square" rtlCol="0">
+            <a:spAutoFit/>
+          </a:bodyPr>
+          <a:lstStyle/>
+          <a:p>
+            <a:r>
+              <a:rPr lang="en-US" sz="1200" strike="sngStrike" dirty="0">
+                <a:solidFill>
+                  <a:schemeClr val="bg1">
+                    <a:lumMod val="50000"/>
+                  </a:schemeClr>
+                </a:solidFill>
+                <a:latin typeface="Century Gothic" panose="020B0502020202020204" pitchFamily="34" charset="0"/>
+              </a:rPr>
+              <a:t>Main character notices energy of villagers cores being sucked out and flying towards castle</a:t>
+            </a:r>
+          </a:p>
+          <a:p>
+            <a:r>
+              <a:rPr lang="en-US" sz="1200" strike="sngStrike" dirty="0">
+                <a:solidFill>
+                  <a:schemeClr val="bg1">
+                    <a:lumMod val="50000"/>
+                  </a:schemeClr>
+                </a:solidFill>
+                <a:latin typeface="Century Gothic" panose="020B0502020202020204" pitchFamily="34" charset="0"/>
+              </a:rPr>
+              <a:t>Main character notices he is only person unscathed</a:t>
+            </a:r>
+          </a:p>
+          <a:p>
+            <a:r>
+              <a:rPr lang="en-US" sz="1200" dirty="0">
+                <a:solidFill>
+                  <a:schemeClr val="tx2">
+                    <a:lumMod val="60000"/>
+                    <a:lumOff val="40000"/>
+                  </a:schemeClr>
+                </a:solidFill>
+                <a:latin typeface="Century Gothic" panose="020B0502020202020204" pitchFamily="34" charset="0"/>
+              </a:rPr>
+              <a:t>(core sucked out or only person standing come first O|&lt;</a:t>
+            </a:r>
+          </a:p>
+          <a:p>
+            <a:r>
+              <a:rPr lang="en-US" sz="1200" dirty="0">
+                <a:solidFill>
+                  <a:schemeClr val="tx2">
+                    <a:lumMod val="60000"/>
+                    <a:lumOff val="40000"/>
+                  </a:schemeClr>
+                </a:solidFill>
+                <a:latin typeface="Century Gothic" panose="020B0502020202020204" pitchFamily="34" charset="0"/>
+              </a:rPr>
+              <a:t>I guess he can have a dramatic moment of surveying the surroundings before things get even worse)</a:t>
+            </a:r>
+          </a:p>
+          <a:p>
+            <a:r>
+              <a:rPr lang="en-US" sz="1200" strike="sngStrike" dirty="0">
+                <a:solidFill>
+                  <a:schemeClr val="bg1">
+                    <a:lumMod val="50000"/>
+                  </a:schemeClr>
+                </a:solidFill>
+                <a:latin typeface="Century Gothic" panose="020B0502020202020204" pitchFamily="34" charset="0"/>
+              </a:rPr>
+              <a:t>The farmer stands and surveys his surroundings, shocked by the situation. He was the only person that is still awake in the entire village</a:t>
+            </a:r>
+            <a:r>
+              <a:rPr lang="en-US" sz="1200" dirty="0">
+                <a:solidFill>
+                  <a:schemeClr val="tx1">
+                    <a:lumMod val="95000"/>
+                    <a:lumOff val="5000"/>
+                  </a:schemeClr>
+                </a:solidFill>
+                <a:latin typeface="Century Gothic" panose="020B0502020202020204" pitchFamily="34" charset="0"/>
+              </a:rPr>
+              <a:t>. Then, something caught his eyes. He notices the cores of his fellow villagers detaching and flying into the air, towards the castle. Without their cores, they will never wake up again!</a:t>
+            </a:r>
+          </a:p>
+        </p:txBody>
+      </p:sp>
     </p:spTree>
     <p:extLst>
       <p:ext uri="{BB962C8B-B14F-4D97-AF65-F5344CB8AC3E}">
@@ -5360,105 +5471,6 @@
       </p:sp>
       <p:sp>
         <p:nvSpPr>
-          <p:cNvPr id="14" name="TextBox 13">
-            <a:extLst>
-              <a:ext uri="{FF2B5EF4-FFF2-40B4-BE49-F238E27FC236}">
-                <a16:creationId xmlns:a16="http://schemas.microsoft.com/office/drawing/2014/main" id="{47A5CFE1-1682-4D81-982A-930D56C037D6}"/>
-              </a:ext>
-            </a:extLst>
-          </p:cNvPr>
-          <p:cNvSpPr txBox="1"/>
-          <p:nvPr/>
-        </p:nvSpPr>
-        <p:spPr>
-          <a:xfrm>
-            <a:off x="909938" y="1738337"/>
-            <a:ext cx="7488832" cy="1754326"/>
-          </a:xfrm>
-          <a:prstGeom prst="rect">
-            <a:avLst/>
-          </a:prstGeom>
-          <a:solidFill>
-            <a:schemeClr val="bg1"/>
-          </a:solidFill>
-        </p:spPr>
-        <p:txBody>
-          <a:bodyPr wrap="square" rtlCol="0">
-            <a:spAutoFit/>
-          </a:bodyPr>
-          <a:lstStyle/>
-          <a:p>
-            <a:r>
-              <a:rPr lang="en-US" sz="1200" strike="sngStrike" dirty="0">
-                <a:solidFill>
-                  <a:schemeClr val="bg1">
-                    <a:lumMod val="50000"/>
-                  </a:schemeClr>
-                </a:solidFill>
-                <a:latin typeface="Century Gothic" panose="020B0502020202020204" pitchFamily="34" charset="0"/>
-              </a:rPr>
-              <a:t>Main character notices energy of villagers cores being sucked out and flying towards castle</a:t>
-            </a:r>
-          </a:p>
-          <a:p>
-            <a:r>
-              <a:rPr lang="en-US" sz="1200" strike="sngStrike" dirty="0">
-                <a:solidFill>
-                  <a:schemeClr val="bg1">
-                    <a:lumMod val="50000"/>
-                  </a:schemeClr>
-                </a:solidFill>
-                <a:latin typeface="Century Gothic" panose="020B0502020202020204" pitchFamily="34" charset="0"/>
-              </a:rPr>
-              <a:t>Main character notices he is only person unscathed</a:t>
-            </a:r>
-          </a:p>
-          <a:p>
-            <a:r>
-              <a:rPr lang="en-US" sz="1200" dirty="0">
-                <a:solidFill>
-                  <a:schemeClr val="tx2">
-                    <a:lumMod val="60000"/>
-                    <a:lumOff val="40000"/>
-                  </a:schemeClr>
-                </a:solidFill>
-                <a:latin typeface="Century Gothic" panose="020B0502020202020204" pitchFamily="34" charset="0"/>
-              </a:rPr>
-              <a:t>(core sucked out or only person standing come first O|&lt;</a:t>
-            </a:r>
-          </a:p>
-          <a:p>
-            <a:r>
-              <a:rPr lang="en-US" sz="1200" dirty="0">
-                <a:solidFill>
-                  <a:schemeClr val="tx2">
-                    <a:lumMod val="60000"/>
-                    <a:lumOff val="40000"/>
-                  </a:schemeClr>
-                </a:solidFill>
-                <a:latin typeface="Century Gothic" panose="020B0502020202020204" pitchFamily="34" charset="0"/>
-              </a:rPr>
-              <a:t>I guess he can have a dramatic moment of surveying the surroundings before things get even worse)</a:t>
-            </a:r>
-          </a:p>
-          <a:p>
-            <a:r>
-              <a:rPr lang="en-US" sz="1200" dirty="0">
-                <a:solidFill>
-                  <a:schemeClr val="tx1">
-                    <a:lumMod val="95000"/>
-                    <a:lumOff val="5000"/>
-                  </a:schemeClr>
-                </a:solidFill>
-                <a:latin typeface="Century Gothic" panose="020B0502020202020204" pitchFamily="34" charset="0"/>
-              </a:rPr>
-              <a:t>The farmer stands and surveys his surroundings, shocked by the situation. He was the only person that is still awake in the entire village. Then, something caught his eyes. He notices the cores of his fellow villagers detaching and flying into the air, towards the castle. Without their cores, they will never wake up again!</a:t>
-            </a:r>
-          </a:p>
-        </p:txBody>
-      </p:sp>
-      <p:sp>
-        <p:nvSpPr>
           <p:cNvPr id="15" name="TextBox 14">
             <a:extLst>
               <a:ext uri="{FF2B5EF4-FFF2-40B4-BE49-F238E27FC236}">
@@ -5471,8 +5483,8 @@
         </p:nvSpPr>
         <p:spPr>
           <a:xfrm>
-            <a:off x="906084" y="4521943"/>
-            <a:ext cx="7488832" cy="2123658"/>
+            <a:off x="578548" y="1772418"/>
+            <a:ext cx="8295625" cy="1938992"/>
           </a:xfrm>
           <a:prstGeom prst="rect">
             <a:avLst/>
@@ -5657,6 +5669,138 @@
                 <a:latin typeface="Century Gothic" panose="020B0502020202020204" pitchFamily="34" charset="0"/>
               </a:rPr>
               <a:t>) he was a tyrant that wanted to sacrifice his people for more power, but he died before he could do so. Now he has freed himself from god and came back to wreak havoc. Farmer gets gods power to defeat the spirit.</a:t>
+            </a:r>
+          </a:p>
+        </p:txBody>
+      </p:sp>
+      <p:sp>
+        <p:nvSpPr>
+          <p:cNvPr id="16" name="TextBox 15">
+            <a:extLst>
+              <a:ext uri="{FF2B5EF4-FFF2-40B4-BE49-F238E27FC236}">
+                <a16:creationId xmlns:a16="http://schemas.microsoft.com/office/drawing/2014/main" id="{DCED554B-D081-4478-BC00-3B31257A1273}"/>
+              </a:ext>
+            </a:extLst>
+          </p:cNvPr>
+          <p:cNvSpPr txBox="1"/>
+          <p:nvPr/>
+        </p:nvSpPr>
+        <p:spPr>
+          <a:xfrm>
+            <a:off x="827584" y="4488699"/>
+            <a:ext cx="7488832" cy="1384995"/>
+          </a:xfrm>
+          <a:prstGeom prst="rect">
+            <a:avLst/>
+          </a:prstGeom>
+          <a:solidFill>
+            <a:schemeClr val="bg1"/>
+          </a:solidFill>
+        </p:spPr>
+        <p:txBody>
+          <a:bodyPr wrap="square" rtlCol="0">
+            <a:spAutoFit/>
+          </a:bodyPr>
+          <a:lstStyle/>
+          <a:p>
+            <a:r>
+              <a:rPr lang="en-US" sz="1200" dirty="0">
+                <a:latin typeface="Century Gothic" panose="020B0502020202020204" pitchFamily="34" charset="0"/>
+              </a:rPr>
+              <a:t>(</a:t>
+            </a:r>
+            <a:r>
+              <a:rPr lang="en-US" sz="1200" dirty="0" err="1">
+                <a:latin typeface="Century Gothic" panose="020B0502020202020204" pitchFamily="34" charset="0"/>
+              </a:rPr>
+              <a:t>ooga</a:t>
+            </a:r>
+            <a:r>
+              <a:rPr lang="en-US" sz="1200" dirty="0">
+                <a:latin typeface="Century Gothic" panose="020B0502020202020204" pitchFamily="34" charset="0"/>
+              </a:rPr>
+              <a:t> </a:t>
+            </a:r>
+            <a:r>
+              <a:rPr lang="en-US" sz="1200" dirty="0" err="1">
+                <a:latin typeface="Century Gothic" panose="020B0502020202020204" pitchFamily="34" charset="0"/>
+              </a:rPr>
+              <a:t>booga</a:t>
+            </a:r>
+            <a:r>
+              <a:rPr lang="en-US" sz="1200" dirty="0">
+                <a:latin typeface="Century Gothic" panose="020B0502020202020204" pitchFamily="34" charset="0"/>
+              </a:rPr>
+              <a:t> actual gameplay part </a:t>
+            </a:r>
+            <a:r>
+              <a:rPr lang="en-US" sz="1200" dirty="0" err="1">
+                <a:latin typeface="Century Gothic" panose="020B0502020202020204" pitchFamily="34" charset="0"/>
+              </a:rPr>
+              <a:t>wheeeeee</a:t>
+            </a:r>
+            <a:endParaRPr lang="en-US" sz="1200" dirty="0">
+              <a:latin typeface="Century Gothic" panose="020B0502020202020204" pitchFamily="34" charset="0"/>
+            </a:endParaRPr>
+          </a:p>
+          <a:p>
+            <a:r>
+              <a:rPr lang="en-US" sz="1200" dirty="0">
+                <a:latin typeface="Century Gothic" panose="020B0502020202020204" pitchFamily="34" charset="0"/>
+              </a:rPr>
+              <a:t>Anyways, current story is hard to put in branching narratives :D</a:t>
+            </a:r>
+          </a:p>
+          <a:p>
+            <a:r>
+              <a:rPr lang="en-US" sz="1200" dirty="0">
+                <a:latin typeface="Century Gothic" panose="020B0502020202020204" pitchFamily="34" charset="0"/>
+              </a:rPr>
+              <a:t>Guess I perish)</a:t>
+            </a:r>
+          </a:p>
+          <a:p>
+            <a:r>
+              <a:rPr lang="en-US" sz="1200" dirty="0">
+                <a:latin typeface="Century Gothic" panose="020B0502020202020204" pitchFamily="34" charset="0"/>
+              </a:rPr>
+              <a:t>Farmer gets warped to the castle in the sky by god and he starts his quest to save the world! Unfortunately, the area is taken over by soldiers summoned by the evil spirit. He struggles through the overwhelming amount of soldiers and make it to the throne room </a:t>
+            </a:r>
+            <a:r>
+              <a:rPr lang="en-US" sz="1200" dirty="0">
+                <a:solidFill>
+                  <a:schemeClr val="tx2">
+                    <a:lumMod val="60000"/>
+                    <a:lumOff val="40000"/>
+                  </a:schemeClr>
+                </a:solidFill>
+                <a:latin typeface="Century Gothic" panose="020B0502020202020204" pitchFamily="34" charset="0"/>
+              </a:rPr>
+              <a:t>(</a:t>
+            </a:r>
+            <a:r>
+              <a:rPr lang="en-US" sz="1200" dirty="0" err="1">
+                <a:solidFill>
+                  <a:schemeClr val="tx2">
+                    <a:lumMod val="60000"/>
+                    <a:lumOff val="40000"/>
+                  </a:schemeClr>
+                </a:solidFill>
+                <a:latin typeface="Century Gothic" panose="020B0502020202020204" pitchFamily="34" charset="0"/>
+              </a:rPr>
+              <a:t>hufidas</a:t>
+            </a:r>
+            <a:r>
+              <a:rPr lang="en-US" sz="1200" dirty="0">
+                <a:solidFill>
+                  <a:schemeClr val="tx2">
+                    <a:lumMod val="60000"/>
+                    <a:lumOff val="40000"/>
+                  </a:schemeClr>
+                </a:solidFill>
+                <a:latin typeface="Century Gothic" panose="020B0502020202020204" pitchFamily="34" charset="0"/>
+              </a:rPr>
+              <a:t> need to show situation is very tough on farmer, 1 vs a whole army)</a:t>
             </a:r>
           </a:p>
         </p:txBody>
@@ -5846,20 +5990,20 @@
       </p:sp>
       <p:sp>
         <p:nvSpPr>
-          <p:cNvPr id="16" name="TextBox 15">
+          <p:cNvPr id="2" name="Rectangle 1">
             <a:extLst>
               <a:ext uri="{FF2B5EF4-FFF2-40B4-BE49-F238E27FC236}">
-                <a16:creationId xmlns:a16="http://schemas.microsoft.com/office/drawing/2014/main" id="{DCED554B-D081-4478-BC00-3B31257A1273}"/>
+                <a16:creationId xmlns:a16="http://schemas.microsoft.com/office/drawing/2014/main" id="{BA89E3C9-F1EA-93A7-ACD6-F859DB717E1F}"/>
               </a:ext>
             </a:extLst>
           </p:cNvPr>
-          <p:cNvSpPr txBox="1"/>
+          <p:cNvSpPr/>
           <p:nvPr/>
         </p:nvSpPr>
         <p:spPr>
           <a:xfrm>
-            <a:off x="611560" y="1844824"/>
-            <a:ext cx="7488832" cy="1384995"/>
+            <a:off x="827584" y="1916832"/>
+            <a:ext cx="7128792" cy="1152128"/>
           </a:xfrm>
           <a:prstGeom prst="rect">
             <a:avLst/>
@@ -5867,111 +6011,32 @@
           <a:solidFill>
             <a:schemeClr val="bg1"/>
           </a:solidFill>
+          <a:ln>
+            <a:noFill/>
+          </a:ln>
         </p:spPr>
-        <p:txBody>
-          <a:bodyPr wrap="square" rtlCol="0">
-            <a:spAutoFit/>
-          </a:bodyPr>
+        <p:style>
+          <a:lnRef idx="2">
+            <a:schemeClr val="accent6"/>
+          </a:lnRef>
+          <a:fillRef idx="1">
+            <a:schemeClr val="lt1"/>
+          </a:fillRef>
+          <a:effectRef idx="0">
+            <a:schemeClr val="accent6"/>
+          </a:effectRef>
+          <a:fontRef idx="minor">
+            <a:schemeClr val="dk1"/>
+          </a:fontRef>
+        </p:style>
+        <p:txBody>
+          <a:bodyPr rtlCol="0" anchor="ctr"/>
           <a:lstStyle/>
           <a:p>
-            <a:r>
-              <a:rPr lang="en-US" sz="1200" dirty="0">
-                <a:latin typeface="Century Gothic" panose="020B0502020202020204" pitchFamily="34" charset="0"/>
-              </a:rPr>
-              <a:t>(</a:t>
-            </a:r>
-            <a:r>
-              <a:rPr lang="en-US" sz="1200" dirty="0" err="1">
-                <a:latin typeface="Century Gothic" panose="020B0502020202020204" pitchFamily="34" charset="0"/>
-              </a:rPr>
-              <a:t>ooga</a:t>
-            </a:r>
-            <a:r>
-              <a:rPr lang="en-US" sz="1200" dirty="0">
-                <a:latin typeface="Century Gothic" panose="020B0502020202020204" pitchFamily="34" charset="0"/>
-              </a:rPr>
-              <a:t> </a:t>
-            </a:r>
-            <a:r>
-              <a:rPr lang="en-US" sz="1200" dirty="0" err="1">
-                <a:latin typeface="Century Gothic" panose="020B0502020202020204" pitchFamily="34" charset="0"/>
-              </a:rPr>
-              <a:t>booga</a:t>
-            </a:r>
-            <a:r>
-              <a:rPr lang="en-US" sz="1200" dirty="0">
-                <a:latin typeface="Century Gothic" panose="020B0502020202020204" pitchFamily="34" charset="0"/>
-              </a:rPr>
-              <a:t> actual gameplay part </a:t>
-            </a:r>
-            <a:r>
-              <a:rPr lang="en-US" sz="1200" dirty="0" err="1">
-                <a:latin typeface="Century Gothic" panose="020B0502020202020204" pitchFamily="34" charset="0"/>
-              </a:rPr>
-              <a:t>wheeeeee</a:t>
-            </a:r>
-            <a:endParaRPr lang="en-US" sz="1200" dirty="0">
-              <a:latin typeface="Century Gothic" panose="020B0502020202020204" pitchFamily="34" charset="0"/>
-            </a:endParaRPr>
-          </a:p>
-          <a:p>
-            <a:r>
-              <a:rPr lang="en-US" sz="1200" dirty="0">
-                <a:latin typeface="Century Gothic" panose="020B0502020202020204" pitchFamily="34" charset="0"/>
-              </a:rPr>
-              <a:t>Anyways, current story is hard to put in branching narratives :D</a:t>
-            </a:r>
-          </a:p>
-          <a:p>
-            <a:r>
-              <a:rPr lang="en-US" sz="1200" dirty="0">
-                <a:latin typeface="Century Gothic" panose="020B0502020202020204" pitchFamily="34" charset="0"/>
-              </a:rPr>
-              <a:t>Guess I perish)</a:t>
-            </a:r>
-          </a:p>
-          <a:p>
-            <a:r>
-              <a:rPr lang="en-US" sz="1200" dirty="0">
-                <a:latin typeface="Century Gothic" panose="020B0502020202020204" pitchFamily="34" charset="0"/>
-              </a:rPr>
-              <a:t>Farmer gets warped to the castle in the sky by god and he starts his quest to save the world! Unfortunately, the area is taken over by soldiers summoned by the evil spirit. He struggles through the overwhelming amount of soldiers and make it to the throne room </a:t>
-            </a:r>
-            <a:r>
-              <a:rPr lang="en-US" sz="1200" dirty="0">
-                <a:solidFill>
-                  <a:schemeClr val="tx2">
-                    <a:lumMod val="60000"/>
-                    <a:lumOff val="40000"/>
-                  </a:schemeClr>
-                </a:solidFill>
-                <a:latin typeface="Century Gothic" panose="020B0502020202020204" pitchFamily="34" charset="0"/>
-              </a:rPr>
-              <a:t>(</a:t>
-            </a:r>
-            <a:r>
-              <a:rPr lang="en-US" sz="1200" dirty="0" err="1">
-                <a:solidFill>
-                  <a:schemeClr val="tx2">
-                    <a:lumMod val="60000"/>
-                    <a:lumOff val="40000"/>
-                  </a:schemeClr>
-                </a:solidFill>
-                <a:latin typeface="Century Gothic" panose="020B0502020202020204" pitchFamily="34" charset="0"/>
-              </a:rPr>
-              <a:t>hufidas</a:t>
-            </a:r>
-            <a:r>
-              <a:rPr lang="en-US" sz="1200" dirty="0">
-                <a:solidFill>
-                  <a:schemeClr val="tx2">
-                    <a:lumMod val="60000"/>
-                    <a:lumOff val="40000"/>
-                  </a:schemeClr>
-                </a:solidFill>
-                <a:latin typeface="Century Gothic" panose="020B0502020202020204" pitchFamily="34" charset="0"/>
-              </a:rPr>
-              <a:t> need to show situation is very tough on farmer, 1 vs a whole army)</a:t>
+            <a:pPr algn="ctr"/>
+            <a:r>
+              <a:rPr lang="en-SG" dirty="0"/>
+              <a:t>He defeat all the soldiers and makes it to the cores. Just as he was about to free the cores, the boss suddenly appears. Farmer was unprepared for sudden face off and was beaten to death. </a:t>
             </a:r>
           </a:p>
         </p:txBody>
@@ -6335,7 +6400,7 @@
               <a:rPr lang="en-US" sz="1200" dirty="0">
                 <a:latin typeface="Century Gothic" panose="020B0502020202020204" pitchFamily="34" charset="0"/>
               </a:rPr>
-              <a:t>???</a:t>
+              <a:t>Main character is resurrected by crystals he got earlier from god</a:t>
             </a:r>
           </a:p>
           <a:p>
@@ -6343,7 +6408,7 @@
               <a:rPr lang="en-US" sz="1200" dirty="0">
                 <a:latin typeface="Century Gothic" panose="020B0502020202020204" pitchFamily="34" charset="0"/>
               </a:rPr>
-              <a:t>???</a:t>
+              <a:t>Boss fight boss fight &gt;:D</a:t>
             </a:r>
           </a:p>
           <a:p>
@@ -6351,7 +6416,7 @@
               <a:rPr lang="en-US" sz="1200" dirty="0">
                 <a:latin typeface="Century Gothic" panose="020B0502020202020204" pitchFamily="34" charset="0"/>
               </a:rPr>
-              <a:t>???</a:t>
+              <a:t>Main character defeats the boss</a:t>
             </a:r>
           </a:p>
         </p:txBody>
@@ -6390,7 +6455,7 @@
               <a:rPr lang="en-US" sz="1200" dirty="0">
                 <a:latin typeface="Century Gothic" panose="020B0502020202020204" pitchFamily="34" charset="0"/>
               </a:rPr>
-              <a:t>???</a:t>
+              <a:t>Spirit was captured by god again (probably destroyed)</a:t>
             </a:r>
           </a:p>
           <a:p>
@@ -6398,7 +6463,7 @@
               <a:rPr lang="en-US" sz="1200" dirty="0">
                 <a:latin typeface="Century Gothic" panose="020B0502020202020204" pitchFamily="34" charset="0"/>
               </a:rPr>
-              <a:t>???</a:t>
+              <a:t>Main character frees the cores which returns back to the villagers</a:t>
             </a:r>
           </a:p>
           <a:p>
@@ -6406,8 +6471,17 @@
               <a:rPr lang="en-US" sz="1200" dirty="0">
                 <a:latin typeface="Century Gothic" panose="020B0502020202020204" pitchFamily="34" charset="0"/>
               </a:rPr>
-              <a:t>???</a:t>
-            </a:r>
+              <a:t>Farmer is hero </a:t>
+            </a:r>
+            <a:r>
+              <a:rPr lang="en-US" sz="1200" dirty="0" err="1">
+                <a:latin typeface="Century Gothic" panose="020B0502020202020204" pitchFamily="34" charset="0"/>
+              </a:rPr>
+              <a:t>yayyyyyyyy</a:t>
+            </a:r>
+            <a:endParaRPr lang="en-US" sz="1200" dirty="0">
+              <a:latin typeface="Century Gothic" panose="020B0502020202020204" pitchFamily="34" charset="0"/>
+            </a:endParaRPr>
           </a:p>
         </p:txBody>
       </p:sp>
@@ -6415,6 +6489,143 @@
     <p:extLst>
       <p:ext uri="{BB962C8B-B14F-4D97-AF65-F5344CB8AC3E}">
         <p14:creationId xmlns:p14="http://schemas.microsoft.com/office/powerpoint/2010/main" val="1935138"/>
+      </p:ext>
+    </p:extLst>
+  </p:cSld>
+  <p:clrMapOvr>
+    <a:masterClrMapping/>
+  </p:clrMapOvr>
+</p:sld>
+</file>
+
+<file path=ppt/slides/slide6.xml><?xml version="1.0" encoding="utf-8"?>
+<p:sld xmlns:a="http://schemas.openxmlformats.org/drawingml/2006/main" xmlns:r="http://schemas.openxmlformats.org/officeDocument/2006/relationships" xmlns:p="http://schemas.openxmlformats.org/presentationml/2006/main">
+  <p:cSld>
+    <p:spTree>
+      <p:nvGrpSpPr>
+        <p:cNvPr id="1" name=""/>
+        <p:cNvGrpSpPr/>
+        <p:nvPr/>
+      </p:nvGrpSpPr>
+      <p:grpSpPr>
+        <a:xfrm>
+          <a:off x="0" y="0"/>
+          <a:ext cx="0" cy="0"/>
+          <a:chOff x="0" y="0"/>
+          <a:chExt cx="0" cy="0"/>
+        </a:xfrm>
+      </p:grpSpPr>
+      <p:sp>
+        <p:nvSpPr>
+          <p:cNvPr id="2" name="Title 1">
+            <a:extLst>
+              <a:ext uri="{FF2B5EF4-FFF2-40B4-BE49-F238E27FC236}">
+                <a16:creationId xmlns:a16="http://schemas.microsoft.com/office/drawing/2014/main" id="{262ED1AA-8382-EF91-4715-33B921C47819}"/>
+              </a:ext>
+            </a:extLst>
+          </p:cNvPr>
+          <p:cNvSpPr>
+            <a:spLocks noGrp="1"/>
+          </p:cNvSpPr>
+          <p:nvPr>
+            <p:ph type="title"/>
+          </p:nvPr>
+        </p:nvSpPr>
+        <p:spPr>
+          <a:xfrm>
+            <a:off x="457200" y="-171400"/>
+            <a:ext cx="8229600" cy="1143000"/>
+          </a:xfrm>
+        </p:spPr>
+        <p:txBody>
+          <a:bodyPr>
+            <a:normAutofit/>
+          </a:bodyPr>
+          <a:lstStyle/>
+          <a:p>
+            <a:r>
+              <a:rPr lang="en-GB" sz="3200" b="1" dirty="0">
+                <a:solidFill>
+                  <a:srgbClr val="FF6600"/>
+                </a:solidFill>
+                <a:latin typeface="Century Gothic" panose="020B0502020202020204" pitchFamily="34" charset="0"/>
+              </a:rPr>
+              <a:t>synopsis</a:t>
+            </a:r>
+            <a:endParaRPr lang="en-SG" sz="3200" dirty="0"/>
+          </a:p>
+        </p:txBody>
+      </p:sp>
+      <p:sp>
+        <p:nvSpPr>
+          <p:cNvPr id="3" name="Content Placeholder 2">
+            <a:extLst>
+              <a:ext uri="{FF2B5EF4-FFF2-40B4-BE49-F238E27FC236}">
+                <a16:creationId xmlns:a16="http://schemas.microsoft.com/office/drawing/2014/main" id="{83ABFF48-2C33-3BE9-9AA0-470930A94735}"/>
+              </a:ext>
+            </a:extLst>
+          </p:cNvPr>
+          <p:cNvSpPr>
+            <a:spLocks noGrp="1"/>
+          </p:cNvSpPr>
+          <p:nvPr>
+            <p:ph idx="1"/>
+          </p:nvPr>
+        </p:nvSpPr>
+        <p:spPr/>
+        <p:txBody>
+          <a:bodyPr>
+            <a:normAutofit/>
+          </a:bodyPr>
+          <a:lstStyle/>
+          <a:p>
+            <a:pPr marL="0" indent="0">
+              <a:buNone/>
+            </a:pPr>
+            <a:r>
+              <a:rPr lang="en-SG" sz="2000" dirty="0">
+                <a:solidFill>
+                  <a:schemeClr val="bg1"/>
+                </a:solidFill>
+              </a:rPr>
+              <a:t>Protagonist is a regular farmer that lived a </a:t>
+            </a:r>
+            <a:r>
+              <a:rPr lang="en-SG" sz="2000" dirty="0" err="1">
+                <a:solidFill>
+                  <a:schemeClr val="bg1"/>
+                </a:solidFill>
+              </a:rPr>
+              <a:t>peacefull</a:t>
+            </a:r>
+            <a:r>
+              <a:rPr lang="en-SG" sz="2000" dirty="0">
+                <a:solidFill>
+                  <a:schemeClr val="bg1"/>
+                </a:solidFill>
+              </a:rPr>
+              <a:t> farm life. One day, his village was hit by an earthquake and a castle floated to the sky. Suddenly, a god speaks to him and tells him that an evil vengeful spirit has escaped and took over the castle in the sky. He learns that the spirit stole the core of the villagers and that he is the only one left who can save them. Thus, the god grants him power to defeat the spirit. Protagonist is transported to the sky castle to free the captured cores. The protagonist fights the spirits’ soldiers and unlocks the castle mechanisms to the room holding the cores. Just as the farmer was about to free the cores, the vengeful spirit suddenly ambushes him and kills him. Fortunately, god had given him magical crystals that resurrect the farmer. The farmer then defeats the spirit and </a:t>
+            </a:r>
+            <a:r>
+              <a:rPr lang="en-SG" sz="2000">
+                <a:solidFill>
+                  <a:schemeClr val="bg1"/>
+                </a:solidFill>
+              </a:rPr>
+              <a:t>frees the cores</a:t>
+            </a:r>
+            <a:endParaRPr lang="en-SG" sz="2000" dirty="0">
+              <a:solidFill>
+                <a:schemeClr val="bg1"/>
+              </a:solidFill>
+            </a:endParaRPr>
+          </a:p>
+        </p:txBody>
+      </p:sp>
+    </p:spTree>
+    <p:extLst>
+      <p:ext uri="{BB962C8B-B14F-4D97-AF65-F5344CB8AC3E}">
+        <p14:creationId xmlns:p14="http://schemas.microsoft.com/office/powerpoint/2010/main" val="3856643187"/>
       </p:ext>
     </p:extLst>
   </p:cSld>

</xml_diff>

<commit_message>
iwp + a bit of story creation progress
iwp:
added temporary enemy model into scene
attempted to add enemy class BUT IT BROKE AAAAAAA

current status: fixing technical difficulties linking visual studios and unreal engine BECAUSE ENEMY CLASS CAUSED BUILDING ERROR smh

story creation:
roughly listed key events
added draw.io file so thrs more space to do branching narratives

TODO:
come up with 20 BRANCHING SCENARIOS AAAAAA

honestly, deserved haha :::))))
btw, portfolio is apparently a module now and the submission is due LAST SUNDAY, so yes its late wheeeeeeeee
SUBMIT PORTFOLIO YES
AND EMAIL THE FUCKING NANOTECH TOPIC ALREADY ITS BEEN PROCRASTINATED ON FOR LIKE 3 FUCKING WEEKS
</commit_message>
<xml_diff>
--- a/story creation/assignment submission/DM1374_GSTORY_3-ActTemplate (submission).pptx
+++ b/story creation/assignment submission/DM1374_GSTORY_3-ActTemplate (submission).pptx
@@ -5,7 +5,7 @@
     <p:sldMasterId id="2147483648" r:id="rId1"/>
   </p:sldMasterIdLst>
   <p:notesMasterIdLst>
-    <p:notesMasterId r:id="rId8"/>
+    <p:notesMasterId r:id="rId7"/>
   </p:notesMasterIdLst>
   <p:sldIdLst>
     <p:sldId id="395" r:id="rId2"/>
@@ -13,7 +13,6 @@
     <p:sldId id="401" r:id="rId4"/>
     <p:sldId id="396" r:id="rId5"/>
     <p:sldId id="397" r:id="rId6"/>
-    <p:sldId id="402" r:id="rId7"/>
   </p:sldIdLst>
   <p:sldSz cx="9144000" cy="6858000" type="screen4x3"/>
   <p:notesSz cx="6858000" cy="9144000"/>
@@ -227,7 +226,7 @@
           <a:p>
             <a:fld id="{9E77AEFE-1327-4844-B4B5-F41F35B17512}" type="datetimeFigureOut">
               <a:rPr lang="en-GB" smtClean="0"/>
-              <a:t>05/06/2024</a:t>
+              <a:t>06/06/2024</a:t>
             </a:fld>
             <a:endParaRPr lang="en-GB"/>
           </a:p>
@@ -676,7 +675,7 @@
           <a:p>
             <a:fld id="{49519E08-BB37-41FD-BEA8-F976E813BFC7}" type="datetimeFigureOut">
               <a:rPr lang="en-GB" smtClean="0"/>
-              <a:t>05/06/2024</a:t>
+              <a:t>06/06/2024</a:t>
             </a:fld>
             <a:endParaRPr lang="en-GB"/>
           </a:p>
@@ -928,7 +927,7 @@
           <a:p>
             <a:fld id="{49519E08-BB37-41FD-BEA8-F976E813BFC7}" type="datetimeFigureOut">
               <a:rPr lang="en-GB" smtClean="0"/>
-              <a:t>05/06/2024</a:t>
+              <a:t>06/06/2024</a:t>
             </a:fld>
             <a:endParaRPr lang="en-GB"/>
           </a:p>
@@ -1149,7 +1148,7 @@
           <a:p>
             <a:fld id="{49519E08-BB37-41FD-BEA8-F976E813BFC7}" type="datetimeFigureOut">
               <a:rPr lang="en-GB" smtClean="0"/>
-              <a:t>05/06/2024</a:t>
+              <a:t>06/06/2024</a:t>
             </a:fld>
             <a:endParaRPr lang="en-GB"/>
           </a:p>
@@ -1371,7 +1370,7 @@
           <a:p>
             <a:fld id="{49519E08-BB37-41FD-BEA8-F976E813BFC7}" type="datetimeFigureOut">
               <a:rPr lang="en-GB" smtClean="0"/>
-              <a:t>05/06/2024</a:t>
+              <a:t>06/06/2024</a:t>
             </a:fld>
             <a:endParaRPr lang="en-GB"/>
           </a:p>
@@ -1658,7 +1657,7 @@
           <a:p>
             <a:fld id="{49519E08-BB37-41FD-BEA8-F976E813BFC7}" type="datetimeFigureOut">
               <a:rPr lang="en-GB" smtClean="0"/>
-              <a:t>05/06/2024</a:t>
+              <a:t>06/06/2024</a:t>
             </a:fld>
             <a:endParaRPr lang="en-GB"/>
           </a:p>
@@ -1987,7 +1986,7 @@
           <a:p>
             <a:fld id="{49519E08-BB37-41FD-BEA8-F976E813BFC7}" type="datetimeFigureOut">
               <a:rPr lang="en-GB" smtClean="0"/>
-              <a:t>05/06/2024</a:t>
+              <a:t>06/06/2024</a:t>
             </a:fld>
             <a:endParaRPr lang="en-GB"/>
           </a:p>
@@ -2450,7 +2449,7 @@
           <a:p>
             <a:fld id="{49519E08-BB37-41FD-BEA8-F976E813BFC7}" type="datetimeFigureOut">
               <a:rPr lang="en-GB" smtClean="0"/>
-              <a:t>05/06/2024</a:t>
+              <a:t>06/06/2024</a:t>
             </a:fld>
             <a:endParaRPr lang="en-GB"/>
           </a:p>
@@ -2609,7 +2608,7 @@
           <a:p>
             <a:fld id="{49519E08-BB37-41FD-BEA8-F976E813BFC7}" type="datetimeFigureOut">
               <a:rPr lang="en-GB" smtClean="0"/>
-              <a:t>05/06/2024</a:t>
+              <a:t>06/06/2024</a:t>
             </a:fld>
             <a:endParaRPr lang="en-GB"/>
           </a:p>
@@ -2745,7 +2744,7 @@
           <a:p>
             <a:fld id="{49519E08-BB37-41FD-BEA8-F976E813BFC7}" type="datetimeFigureOut">
               <a:rPr lang="en-GB" smtClean="0"/>
-              <a:t>05/06/2024</a:t>
+              <a:t>06/06/2024</a:t>
             </a:fld>
             <a:endParaRPr lang="en-GB"/>
           </a:p>
@@ -3063,7 +3062,7 @@
           <a:p>
             <a:fld id="{49519E08-BB37-41FD-BEA8-F976E813BFC7}" type="datetimeFigureOut">
               <a:rPr lang="en-GB" smtClean="0"/>
-              <a:t>05/06/2024</a:t>
+              <a:t>06/06/2024</a:t>
             </a:fld>
             <a:endParaRPr lang="en-GB"/>
           </a:p>
@@ -3357,7 +3356,7 @@
           <a:p>
             <a:fld id="{49519E08-BB37-41FD-BEA8-F976E813BFC7}" type="datetimeFigureOut">
               <a:rPr lang="en-GB" smtClean="0"/>
-              <a:t>05/06/2024</a:t>
+              <a:t>06/06/2024</a:t>
             </a:fld>
             <a:endParaRPr lang="en-GB"/>
           </a:p>
@@ -3616,7 +3615,7 @@
           <a:p>
             <a:fld id="{49519E08-BB37-41FD-BEA8-F976E813BFC7}" type="datetimeFigureOut">
               <a:rPr lang="en-GB" smtClean="0"/>
-              <a:t>05/06/2024</a:t>
+              <a:t>06/06/2024</a:t>
             </a:fld>
             <a:endParaRPr lang="en-GB"/>
           </a:p>
@@ -6489,143 +6488,6 @@
     <p:extLst>
       <p:ext uri="{BB962C8B-B14F-4D97-AF65-F5344CB8AC3E}">
         <p14:creationId xmlns:p14="http://schemas.microsoft.com/office/powerpoint/2010/main" val="1935138"/>
-      </p:ext>
-    </p:extLst>
-  </p:cSld>
-  <p:clrMapOvr>
-    <a:masterClrMapping/>
-  </p:clrMapOvr>
-</p:sld>
-</file>
-
-<file path=ppt/slides/slide6.xml><?xml version="1.0" encoding="utf-8"?>
-<p:sld xmlns:a="http://schemas.openxmlformats.org/drawingml/2006/main" xmlns:r="http://schemas.openxmlformats.org/officeDocument/2006/relationships" xmlns:p="http://schemas.openxmlformats.org/presentationml/2006/main">
-  <p:cSld>
-    <p:spTree>
-      <p:nvGrpSpPr>
-        <p:cNvPr id="1" name=""/>
-        <p:cNvGrpSpPr/>
-        <p:nvPr/>
-      </p:nvGrpSpPr>
-      <p:grpSpPr>
-        <a:xfrm>
-          <a:off x="0" y="0"/>
-          <a:ext cx="0" cy="0"/>
-          <a:chOff x="0" y="0"/>
-          <a:chExt cx="0" cy="0"/>
-        </a:xfrm>
-      </p:grpSpPr>
-      <p:sp>
-        <p:nvSpPr>
-          <p:cNvPr id="2" name="Title 1">
-            <a:extLst>
-              <a:ext uri="{FF2B5EF4-FFF2-40B4-BE49-F238E27FC236}">
-                <a16:creationId xmlns:a16="http://schemas.microsoft.com/office/drawing/2014/main" id="{262ED1AA-8382-EF91-4715-33B921C47819}"/>
-              </a:ext>
-            </a:extLst>
-          </p:cNvPr>
-          <p:cNvSpPr>
-            <a:spLocks noGrp="1"/>
-          </p:cNvSpPr>
-          <p:nvPr>
-            <p:ph type="title"/>
-          </p:nvPr>
-        </p:nvSpPr>
-        <p:spPr>
-          <a:xfrm>
-            <a:off x="457200" y="-171400"/>
-            <a:ext cx="8229600" cy="1143000"/>
-          </a:xfrm>
-        </p:spPr>
-        <p:txBody>
-          <a:bodyPr>
-            <a:normAutofit/>
-          </a:bodyPr>
-          <a:lstStyle/>
-          <a:p>
-            <a:r>
-              <a:rPr lang="en-GB" sz="3200" b="1" dirty="0">
-                <a:solidFill>
-                  <a:srgbClr val="FF6600"/>
-                </a:solidFill>
-                <a:latin typeface="Century Gothic" panose="020B0502020202020204" pitchFamily="34" charset="0"/>
-              </a:rPr>
-              <a:t>synopsis</a:t>
-            </a:r>
-            <a:endParaRPr lang="en-SG" sz="3200" dirty="0"/>
-          </a:p>
-        </p:txBody>
-      </p:sp>
-      <p:sp>
-        <p:nvSpPr>
-          <p:cNvPr id="3" name="Content Placeholder 2">
-            <a:extLst>
-              <a:ext uri="{FF2B5EF4-FFF2-40B4-BE49-F238E27FC236}">
-                <a16:creationId xmlns:a16="http://schemas.microsoft.com/office/drawing/2014/main" id="{83ABFF48-2C33-3BE9-9AA0-470930A94735}"/>
-              </a:ext>
-            </a:extLst>
-          </p:cNvPr>
-          <p:cNvSpPr>
-            <a:spLocks noGrp="1"/>
-          </p:cNvSpPr>
-          <p:nvPr>
-            <p:ph idx="1"/>
-          </p:nvPr>
-        </p:nvSpPr>
-        <p:spPr/>
-        <p:txBody>
-          <a:bodyPr>
-            <a:normAutofit/>
-          </a:bodyPr>
-          <a:lstStyle/>
-          <a:p>
-            <a:pPr marL="0" indent="0">
-              <a:buNone/>
-            </a:pPr>
-            <a:r>
-              <a:rPr lang="en-SG" sz="2000" dirty="0">
-                <a:solidFill>
-                  <a:schemeClr val="bg1"/>
-                </a:solidFill>
-              </a:rPr>
-              <a:t>Protagonist is a regular farmer that lived a </a:t>
-            </a:r>
-            <a:r>
-              <a:rPr lang="en-SG" sz="2000" dirty="0" err="1">
-                <a:solidFill>
-                  <a:schemeClr val="bg1"/>
-                </a:solidFill>
-              </a:rPr>
-              <a:t>peacefull</a:t>
-            </a:r>
-            <a:r>
-              <a:rPr lang="en-SG" sz="2000" dirty="0">
-                <a:solidFill>
-                  <a:schemeClr val="bg1"/>
-                </a:solidFill>
-              </a:rPr>
-              <a:t> farm life. One day, his village was hit by an earthquake and a castle floated to the sky. Suddenly, a god speaks to him and tells him that an evil vengeful spirit has escaped and took over the castle in the sky. He learns that the spirit stole the core of the villagers and that he is the only one left who can save them. Thus, the god grants him power to defeat the spirit. Protagonist is transported to the sky castle to free the captured cores. The protagonist fights the spirits’ soldiers and unlocks the castle mechanisms to the room holding the cores. Just as the farmer was about to free the cores, the vengeful spirit suddenly ambushes him and kills him. Fortunately, god had given him magical crystals that resurrect the farmer. The farmer then defeats the spirit and </a:t>
-            </a:r>
-            <a:r>
-              <a:rPr lang="en-SG" sz="2000">
-                <a:solidFill>
-                  <a:schemeClr val="bg1"/>
-                </a:solidFill>
-              </a:rPr>
-              <a:t>frees the cores</a:t>
-            </a:r>
-            <a:endParaRPr lang="en-SG" sz="2000" dirty="0">
-              <a:solidFill>
-                <a:schemeClr val="bg1"/>
-              </a:solidFill>
-            </a:endParaRPr>
-          </a:p>
-        </p:txBody>
-      </p:sp>
-    </p:spTree>
-    <p:extLst>
-      <p:ext uri="{BB962C8B-B14F-4D97-AF65-F5344CB8AC3E}">
-        <p14:creationId xmlns:p14="http://schemas.microsoft.com/office/powerpoint/2010/main" val="3856643187"/>
       </p:ext>
     </p:extLst>
   </p:cSld>

</xml_diff>